<commit_message>
updates to he results and ppt
</commit_message>
<xml_diff>
--- a/docs/brain_sync.pptx
+++ b/docs/brain_sync.pptx
@@ -9,13 +9,14 @@
     <p:sldId id="257" r:id="rId3"/>
     <p:sldId id="258" r:id="rId4"/>
     <p:sldId id="259" r:id="rId5"/>
-    <p:sldId id="260" r:id="rId6"/>
-    <p:sldId id="261" r:id="rId7"/>
-    <p:sldId id="266" r:id="rId8"/>
-    <p:sldId id="262" r:id="rId9"/>
-    <p:sldId id="263" r:id="rId10"/>
-    <p:sldId id="265" r:id="rId11"/>
-    <p:sldId id="264" r:id="rId12"/>
+    <p:sldId id="267" r:id="rId6"/>
+    <p:sldId id="260" r:id="rId7"/>
+    <p:sldId id="261" r:id="rId8"/>
+    <p:sldId id="268" r:id="rId9"/>
+    <p:sldId id="266" r:id="rId10"/>
+    <p:sldId id="263" r:id="rId11"/>
+    <p:sldId id="265" r:id="rId12"/>
+    <p:sldId id="264" r:id="rId13"/>
   </p:sldIdLst>
   <p:sldSz cx="12192000" cy="6858000"/>
   <p:notesSz cx="6858000" cy="9144000"/>
@@ -310,7 +311,7 @@
           <a:p>
             <a:fld id="{16885065-5610-4AF7-9C11-064BC18A2FE3}" type="datetimeFigureOut">
               <a:rPr lang="en-US" smtClean="0"/>
-              <a:t>7/31/2016</a:t>
+              <a:t>8/1/2016</a:t>
             </a:fld>
             <a:endParaRPr lang="en-US"/>
           </a:p>
@@ -648,7 +649,7 @@
           <a:p>
             <a:fld id="{16885065-5610-4AF7-9C11-064BC18A2FE3}" type="datetimeFigureOut">
               <a:rPr lang="en-US" smtClean="0"/>
-              <a:t>7/31/2016</a:t>
+              <a:t>8/1/2016</a:t>
             </a:fld>
             <a:endParaRPr lang="en-US"/>
           </a:p>
@@ -1049,7 +1050,7 @@
           <a:p>
             <a:fld id="{16885065-5610-4AF7-9C11-064BC18A2FE3}" type="datetimeFigureOut">
               <a:rPr lang="en-US" smtClean="0"/>
-              <a:t>7/31/2016</a:t>
+              <a:t>8/1/2016</a:t>
             </a:fld>
             <a:endParaRPr lang="en-US"/>
           </a:p>
@@ -1385,7 +1386,7 @@
           <a:p>
             <a:fld id="{16885065-5610-4AF7-9C11-064BC18A2FE3}" type="datetimeFigureOut">
               <a:rPr lang="en-US" smtClean="0"/>
-              <a:t>7/31/2016</a:t>
+              <a:t>8/1/2016</a:t>
             </a:fld>
             <a:endParaRPr lang="en-US"/>
           </a:p>
@@ -1705,7 +1706,7 @@
           <a:p>
             <a:fld id="{16885065-5610-4AF7-9C11-064BC18A2FE3}" type="datetimeFigureOut">
               <a:rPr lang="en-US" smtClean="0"/>
-              <a:t>7/31/2016</a:t>
+              <a:t>8/1/2016</a:t>
             </a:fld>
             <a:endParaRPr lang="en-US"/>
           </a:p>
@@ -2101,7 +2102,7 @@
           <a:p>
             <a:fld id="{16885065-5610-4AF7-9C11-064BC18A2FE3}" type="datetimeFigureOut">
               <a:rPr lang="en-US" smtClean="0"/>
-              <a:t>7/31/2016</a:t>
+              <a:t>8/1/2016</a:t>
             </a:fld>
             <a:endParaRPr lang="en-US"/>
           </a:p>
@@ -2358,7 +2359,7 @@
           <a:p>
             <a:fld id="{16885065-5610-4AF7-9C11-064BC18A2FE3}" type="datetimeFigureOut">
               <a:rPr lang="en-US" smtClean="0"/>
-              <a:t>7/31/2016</a:t>
+              <a:t>8/1/2016</a:t>
             </a:fld>
             <a:endParaRPr lang="en-US"/>
           </a:p>
@@ -2620,7 +2621,7 @@
           <a:p>
             <a:fld id="{16885065-5610-4AF7-9C11-064BC18A2FE3}" type="datetimeFigureOut">
               <a:rPr lang="en-US" smtClean="0"/>
-              <a:t>7/31/2016</a:t>
+              <a:t>8/1/2016</a:t>
             </a:fld>
             <a:endParaRPr lang="en-US"/>
           </a:p>
@@ -2882,7 +2883,7 @@
           <a:p>
             <a:fld id="{16885065-5610-4AF7-9C11-064BC18A2FE3}" type="datetimeFigureOut">
               <a:rPr lang="en-US" smtClean="0"/>
-              <a:t>7/31/2016</a:t>
+              <a:t>8/1/2016</a:t>
             </a:fld>
             <a:endParaRPr lang="en-US"/>
           </a:p>
@@ -3211,7 +3212,7 @@
           <a:p>
             <a:fld id="{16885065-5610-4AF7-9C11-064BC18A2FE3}" type="datetimeFigureOut">
               <a:rPr lang="en-US" smtClean="0"/>
-              <a:t>7/31/2016</a:t>
+              <a:t>8/1/2016</a:t>
             </a:fld>
             <a:endParaRPr lang="en-US"/>
           </a:p>
@@ -3534,7 +3535,7 @@
           <a:p>
             <a:fld id="{16885065-5610-4AF7-9C11-064BC18A2FE3}" type="datetimeFigureOut">
               <a:rPr lang="en-US" smtClean="0"/>
-              <a:t>7/31/2016</a:t>
+              <a:t>8/1/2016</a:t>
             </a:fld>
             <a:endParaRPr lang="en-US"/>
           </a:p>
@@ -3991,7 +3992,7 @@
           <a:p>
             <a:fld id="{16885065-5610-4AF7-9C11-064BC18A2FE3}" type="datetimeFigureOut">
               <a:rPr lang="en-US" smtClean="0"/>
-              <a:t>7/31/2016</a:t>
+              <a:t>8/1/2016</a:t>
             </a:fld>
             <a:endParaRPr lang="en-US"/>
           </a:p>
@@ -4196,7 +4197,7 @@
           <a:p>
             <a:fld id="{16885065-5610-4AF7-9C11-064BC18A2FE3}" type="datetimeFigureOut">
               <a:rPr lang="en-US" smtClean="0"/>
-              <a:t>7/31/2016</a:t>
+              <a:t>8/1/2016</a:t>
             </a:fld>
             <a:endParaRPr lang="en-US"/>
           </a:p>
@@ -4373,7 +4374,7 @@
           <a:p>
             <a:fld id="{16885065-5610-4AF7-9C11-064BC18A2FE3}" type="datetimeFigureOut">
               <a:rPr lang="en-US" smtClean="0"/>
-              <a:t>7/31/2016</a:t>
+              <a:t>8/1/2016</a:t>
             </a:fld>
             <a:endParaRPr lang="en-US"/>
           </a:p>
@@ -4706,7 +4707,7 @@
           <a:p>
             <a:fld id="{16885065-5610-4AF7-9C11-064BC18A2FE3}" type="datetimeFigureOut">
               <a:rPr lang="en-US" smtClean="0"/>
-              <a:t>7/31/2016</a:t>
+              <a:t>8/1/2016</a:t>
             </a:fld>
             <a:endParaRPr lang="en-US"/>
           </a:p>
@@ -5051,7 +5052,7 @@
           <a:p>
             <a:fld id="{16885065-5610-4AF7-9C11-064BC18A2FE3}" type="datetimeFigureOut">
               <a:rPr lang="en-US" smtClean="0"/>
-              <a:t>7/31/2016</a:t>
+              <a:t>8/1/2016</a:t>
             </a:fld>
             <a:endParaRPr lang="en-US"/>
           </a:p>
@@ -7168,7 +7169,7 @@
           <a:p>
             <a:fld id="{16885065-5610-4AF7-9C11-064BC18A2FE3}" type="datetimeFigureOut">
               <a:rPr lang="en-US" smtClean="0"/>
-              <a:t>7/31/2016</a:t>
+              <a:t>8/1/2016</a:t>
             </a:fld>
             <a:endParaRPr lang="en-US"/>
           </a:p>
@@ -7696,7 +7697,12 @@
             <p:ph type="ctrTitle"/>
           </p:nvPr>
         </p:nvSpPr>
-        <p:spPr/>
+        <p:spPr>
+          <a:xfrm>
+            <a:off x="2092411" y="1633151"/>
+            <a:ext cx="9420439" cy="2262781"/>
+          </a:xfrm>
+        </p:spPr>
         <p:txBody>
           <a:bodyPr>
             <a:normAutofit/>
@@ -7709,7 +7715,7 @@
             </a:r>
             <a:r>
               <a:rPr lang="en-US" dirty="0"/>
-              <a:t>: Synchronizing resting state brains</a:t>
+              <a:t>: Synchronizing Resting State Brains</a:t>
             </a:r>
           </a:p>
         </p:txBody>
@@ -7724,7 +7730,12 @@
             <p:ph type="subTitle" idx="1"/>
           </p:nvPr>
         </p:nvSpPr>
-        <p:spPr/>
+        <p:spPr>
+          <a:xfrm>
+            <a:off x="3651895" y="4785617"/>
+            <a:ext cx="4272906" cy="412459"/>
+          </a:xfrm>
+        </p:spPr>
         <p:txBody>
           <a:bodyPr/>
           <a:lstStyle/>
@@ -7776,42 +7787,462 @@
             <p:ph type="title"/>
           </p:nvPr>
         </p:nvSpPr>
-        <p:spPr/>
+        <p:spPr>
+          <a:xfrm>
+            <a:off x="2223241" y="105127"/>
+            <a:ext cx="8911687" cy="669231"/>
+          </a:xfrm>
+        </p:spPr>
         <p:txBody>
           <a:bodyPr/>
           <a:lstStyle/>
           <a:p>
             <a:r>
               <a:rPr lang="en-US" dirty="0"/>
-              <a:t>Conclusion</a:t>
-            </a:r>
-          </a:p>
-        </p:txBody>
-      </p:sp>
-      <p:sp>
-        <p:nvSpPr>
-          <p:cNvPr id="3" name="Content Placeholder 2"/>
-          <p:cNvSpPr>
-            <a:spLocks noGrp="1"/>
-          </p:cNvSpPr>
-          <p:nvPr>
-            <p:ph idx="1"/>
-          </p:nvPr>
-        </p:nvSpPr>
-        <p:spPr/>
-        <p:txBody>
-          <a:bodyPr/>
+              <a:t>Session 1 and Session 2 labeled jointly</a:t>
+            </a:r>
+          </a:p>
+        </p:txBody>
+      </p:sp>
+      <p:pic>
+        <p:nvPicPr>
+          <p:cNvPr id="4" name="Picture 3"/>
+          <p:cNvPicPr>
+            <a:picLocks noChangeAspect="1"/>
+          </p:cNvPicPr>
+          <p:nvPr/>
+        </p:nvPicPr>
+        <p:blipFill>
+          <a:blip r:embed="rId2">
+            <a:extLst>
+              <a:ext uri="{28A0092B-C50C-407E-A947-70E740481C1C}">
+                <a14:useLocalDpi xmlns:a14="http://schemas.microsoft.com/office/drawing/2010/main" val="0"/>
+              </a:ext>
+            </a:extLst>
+          </a:blip>
+          <a:stretch>
+            <a:fillRect/>
+          </a:stretch>
+        </p:blipFill>
+        <p:spPr>
+          <a:xfrm>
+            <a:off x="741019" y="2151920"/>
+            <a:ext cx="2571750" cy="1866900"/>
+          </a:xfrm>
+          <a:prstGeom prst="rect">
+            <a:avLst/>
+          </a:prstGeom>
+        </p:spPr>
+      </p:pic>
+      <p:pic>
+        <p:nvPicPr>
+          <p:cNvPr id="5" name="Picture 4"/>
+          <p:cNvPicPr>
+            <a:picLocks noChangeAspect="1"/>
+          </p:cNvPicPr>
+          <p:nvPr/>
+        </p:nvPicPr>
+        <p:blipFill>
+          <a:blip r:embed="rId3">
+            <a:extLst>
+              <a:ext uri="{28A0092B-C50C-407E-A947-70E740481C1C}">
+                <a14:useLocalDpi xmlns:a14="http://schemas.microsoft.com/office/drawing/2010/main" val="0"/>
+              </a:ext>
+            </a:extLst>
+          </a:blip>
+          <a:stretch>
+            <a:fillRect/>
+          </a:stretch>
+        </p:blipFill>
+        <p:spPr>
+          <a:xfrm>
+            <a:off x="3312769" y="2151920"/>
+            <a:ext cx="2571750" cy="1866900"/>
+          </a:xfrm>
+          <a:prstGeom prst="rect">
+            <a:avLst/>
+          </a:prstGeom>
+        </p:spPr>
+      </p:pic>
+      <p:pic>
+        <p:nvPicPr>
+          <p:cNvPr id="8" name="Picture 7"/>
+          <p:cNvPicPr>
+            <a:picLocks noChangeAspect="1"/>
+          </p:cNvPicPr>
+          <p:nvPr/>
+        </p:nvPicPr>
+        <p:blipFill>
+          <a:blip r:embed="rId4">
+            <a:extLst>
+              <a:ext uri="{28A0092B-C50C-407E-A947-70E740481C1C}">
+                <a14:useLocalDpi xmlns:a14="http://schemas.microsoft.com/office/drawing/2010/main" val="0"/>
+              </a:ext>
+            </a:extLst>
+          </a:blip>
+          <a:stretch>
+            <a:fillRect/>
+          </a:stretch>
+        </p:blipFill>
+        <p:spPr>
+          <a:xfrm>
+            <a:off x="741019" y="4018820"/>
+            <a:ext cx="2571750" cy="1866900"/>
+          </a:xfrm>
+          <a:prstGeom prst="rect">
+            <a:avLst/>
+          </a:prstGeom>
+        </p:spPr>
+      </p:pic>
+      <p:pic>
+        <p:nvPicPr>
+          <p:cNvPr id="9" name="Picture 8"/>
+          <p:cNvPicPr>
+            <a:picLocks noChangeAspect="1"/>
+          </p:cNvPicPr>
+          <p:nvPr/>
+        </p:nvPicPr>
+        <p:blipFill>
+          <a:blip r:embed="rId5">
+            <a:extLst>
+              <a:ext uri="{28A0092B-C50C-407E-A947-70E740481C1C}">
+                <a14:useLocalDpi xmlns:a14="http://schemas.microsoft.com/office/drawing/2010/main" val="0"/>
+              </a:ext>
+            </a:extLst>
+          </a:blip>
+          <a:stretch>
+            <a:fillRect/>
+          </a:stretch>
+        </p:blipFill>
+        <p:spPr>
+          <a:xfrm>
+            <a:off x="3312769" y="4018820"/>
+            <a:ext cx="2571750" cy="1866900"/>
+          </a:xfrm>
+          <a:prstGeom prst="rect">
+            <a:avLst/>
+          </a:prstGeom>
+        </p:spPr>
+      </p:pic>
+      <p:pic>
+        <p:nvPicPr>
+          <p:cNvPr id="10" name="Picture 9"/>
+          <p:cNvPicPr>
+            <a:picLocks noChangeAspect="1"/>
+          </p:cNvPicPr>
+          <p:nvPr/>
+        </p:nvPicPr>
+        <p:blipFill>
+          <a:blip r:embed="rId6">
+            <a:extLst>
+              <a:ext uri="{28A0092B-C50C-407E-A947-70E740481C1C}">
+                <a14:useLocalDpi xmlns:a14="http://schemas.microsoft.com/office/drawing/2010/main" val="0"/>
+              </a:ext>
+            </a:extLst>
+          </a:blip>
+          <a:stretch>
+            <a:fillRect/>
+          </a:stretch>
+        </p:blipFill>
+        <p:spPr>
+          <a:xfrm>
+            <a:off x="6621419" y="2151920"/>
+            <a:ext cx="2571750" cy="1866900"/>
+          </a:xfrm>
+          <a:prstGeom prst="rect">
+            <a:avLst/>
+          </a:prstGeom>
+        </p:spPr>
+      </p:pic>
+      <p:pic>
+        <p:nvPicPr>
+          <p:cNvPr id="11" name="Picture 10"/>
+          <p:cNvPicPr>
+            <a:picLocks noChangeAspect="1"/>
+          </p:cNvPicPr>
+          <p:nvPr/>
+        </p:nvPicPr>
+        <p:blipFill>
+          <a:blip r:embed="rId7">
+            <a:extLst>
+              <a:ext uri="{28A0092B-C50C-407E-A947-70E740481C1C}">
+                <a14:useLocalDpi xmlns:a14="http://schemas.microsoft.com/office/drawing/2010/main" val="0"/>
+              </a:ext>
+            </a:extLst>
+          </a:blip>
+          <a:stretch>
+            <a:fillRect/>
+          </a:stretch>
+        </p:blipFill>
+        <p:spPr>
+          <a:xfrm>
+            <a:off x="6622708" y="4018820"/>
+            <a:ext cx="2571750" cy="1866900"/>
+          </a:xfrm>
+          <a:prstGeom prst="rect">
+            <a:avLst/>
+          </a:prstGeom>
+        </p:spPr>
+      </p:pic>
+      <p:pic>
+        <p:nvPicPr>
+          <p:cNvPr id="12" name="Picture 11"/>
+          <p:cNvPicPr>
+            <a:picLocks noChangeAspect="1"/>
+          </p:cNvPicPr>
+          <p:nvPr/>
+        </p:nvPicPr>
+        <p:blipFill>
+          <a:blip r:embed="rId8">
+            <a:extLst>
+              <a:ext uri="{28A0092B-C50C-407E-A947-70E740481C1C}">
+                <a14:useLocalDpi xmlns:a14="http://schemas.microsoft.com/office/drawing/2010/main" val="0"/>
+              </a:ext>
+            </a:extLst>
+          </a:blip>
+          <a:stretch>
+            <a:fillRect/>
+          </a:stretch>
+        </p:blipFill>
+        <p:spPr>
+          <a:xfrm>
+            <a:off x="9189692" y="2151920"/>
+            <a:ext cx="2571750" cy="1866900"/>
+          </a:xfrm>
+          <a:prstGeom prst="rect">
+            <a:avLst/>
+          </a:prstGeom>
+        </p:spPr>
+      </p:pic>
+      <p:pic>
+        <p:nvPicPr>
+          <p:cNvPr id="13" name="Picture 12"/>
+          <p:cNvPicPr>
+            <a:picLocks noChangeAspect="1"/>
+          </p:cNvPicPr>
+          <p:nvPr/>
+        </p:nvPicPr>
+        <p:blipFill>
+          <a:blip r:embed="rId9">
+            <a:extLst>
+              <a:ext uri="{28A0092B-C50C-407E-A947-70E740481C1C}">
+                <a14:useLocalDpi xmlns:a14="http://schemas.microsoft.com/office/drawing/2010/main" val="0"/>
+              </a:ext>
+            </a:extLst>
+          </a:blip>
+          <a:stretch>
+            <a:fillRect/>
+          </a:stretch>
+        </p:blipFill>
+        <p:spPr>
+          <a:xfrm>
+            <a:off x="9189692" y="4018820"/>
+            <a:ext cx="2571750" cy="1866900"/>
+          </a:xfrm>
+          <a:prstGeom prst="rect">
+            <a:avLst/>
+          </a:prstGeom>
+        </p:spPr>
+      </p:pic>
+      <p:sp>
+        <p:nvSpPr>
+          <p:cNvPr id="3" name="TextBox 2"/>
+          <p:cNvSpPr txBox="1"/>
+          <p:nvPr/>
+        </p:nvSpPr>
+        <p:spPr>
+          <a:xfrm>
+            <a:off x="2734964" y="1506154"/>
+            <a:ext cx="1215397" cy="369332"/>
+          </a:xfrm>
+          <a:prstGeom prst="rect">
+            <a:avLst/>
+          </a:prstGeom>
+          <a:noFill/>
+        </p:spPr>
+        <p:txBody>
+          <a:bodyPr wrap="none" rtlCol="0">
+            <a:spAutoFit/>
+          </a:bodyPr>
           <a:lstStyle/>
           <a:p>
             <a:r>
               <a:rPr lang="en-US" dirty="0"/>
-              <a:t>Parameter free approach </a:t>
-            </a:r>
-          </a:p>
+              <a:t>Subject 1</a:t>
+            </a:r>
+          </a:p>
+        </p:txBody>
+      </p:sp>
+      <p:sp>
+        <p:nvSpPr>
+          <p:cNvPr id="14" name="TextBox 13"/>
+          <p:cNvSpPr txBox="1"/>
+          <p:nvPr/>
+        </p:nvSpPr>
+        <p:spPr>
+          <a:xfrm>
+            <a:off x="1445472" y="1782588"/>
+            <a:ext cx="1160895" cy="369332"/>
+          </a:xfrm>
+          <a:prstGeom prst="rect">
+            <a:avLst/>
+          </a:prstGeom>
+          <a:noFill/>
+        </p:spPr>
+        <p:txBody>
+          <a:bodyPr wrap="none" rtlCol="0">
+            <a:spAutoFit/>
+          </a:bodyPr>
+          <a:lstStyle/>
           <a:p>
             <a:r>
               <a:rPr lang="en-US" dirty="0"/>
-              <a:t>Depends on only 2 simple assumptions and nothing more</a:t>
+              <a:t>Session 1</a:t>
+            </a:r>
+          </a:p>
+        </p:txBody>
+      </p:sp>
+      <p:sp>
+        <p:nvSpPr>
+          <p:cNvPr id="15" name="TextBox 14"/>
+          <p:cNvSpPr txBox="1"/>
+          <p:nvPr/>
+        </p:nvSpPr>
+        <p:spPr>
+          <a:xfrm>
+            <a:off x="4018196" y="1782588"/>
+            <a:ext cx="1160895" cy="369332"/>
+          </a:xfrm>
+          <a:prstGeom prst="rect">
+            <a:avLst/>
+          </a:prstGeom>
+          <a:noFill/>
+        </p:spPr>
+        <p:txBody>
+          <a:bodyPr wrap="none" rtlCol="0">
+            <a:spAutoFit/>
+          </a:bodyPr>
+          <a:lstStyle/>
+          <a:p>
+            <a:r>
+              <a:rPr lang="en-US" dirty="0"/>
+              <a:t>Session 2</a:t>
+            </a:r>
+          </a:p>
+        </p:txBody>
+      </p:sp>
+      <p:sp>
+        <p:nvSpPr>
+          <p:cNvPr id="16" name="TextBox 15"/>
+          <p:cNvSpPr txBox="1"/>
+          <p:nvPr/>
+        </p:nvSpPr>
+        <p:spPr>
+          <a:xfrm>
+            <a:off x="7326846" y="1782588"/>
+            <a:ext cx="1160895" cy="369332"/>
+          </a:xfrm>
+          <a:prstGeom prst="rect">
+            <a:avLst/>
+          </a:prstGeom>
+          <a:noFill/>
+        </p:spPr>
+        <p:txBody>
+          <a:bodyPr wrap="none" rtlCol="0">
+            <a:spAutoFit/>
+          </a:bodyPr>
+          <a:lstStyle/>
+          <a:p>
+            <a:r>
+              <a:rPr lang="en-US" dirty="0"/>
+              <a:t>Session 1</a:t>
+            </a:r>
+          </a:p>
+        </p:txBody>
+      </p:sp>
+      <p:sp>
+        <p:nvSpPr>
+          <p:cNvPr id="17" name="TextBox 16"/>
+          <p:cNvSpPr txBox="1"/>
+          <p:nvPr/>
+        </p:nvSpPr>
+        <p:spPr>
+          <a:xfrm>
+            <a:off x="9893313" y="1782588"/>
+            <a:ext cx="1160895" cy="369332"/>
+          </a:xfrm>
+          <a:prstGeom prst="rect">
+            <a:avLst/>
+          </a:prstGeom>
+          <a:noFill/>
+        </p:spPr>
+        <p:txBody>
+          <a:bodyPr wrap="none" rtlCol="0">
+            <a:spAutoFit/>
+          </a:bodyPr>
+          <a:lstStyle/>
+          <a:p>
+            <a:r>
+              <a:rPr lang="en-US" dirty="0"/>
+              <a:t>Session 2</a:t>
+            </a:r>
+          </a:p>
+        </p:txBody>
+      </p:sp>
+      <p:sp>
+        <p:nvSpPr>
+          <p:cNvPr id="18" name="TextBox 17"/>
+          <p:cNvSpPr txBox="1"/>
+          <p:nvPr/>
+        </p:nvSpPr>
+        <p:spPr>
+          <a:xfrm>
+            <a:off x="8677916" y="1553302"/>
+            <a:ext cx="1215397" cy="369332"/>
+          </a:xfrm>
+          <a:prstGeom prst="rect">
+            <a:avLst/>
+          </a:prstGeom>
+          <a:noFill/>
+        </p:spPr>
+        <p:txBody>
+          <a:bodyPr wrap="none" rtlCol="0">
+            <a:spAutoFit/>
+          </a:bodyPr>
+          <a:lstStyle/>
+          <a:p>
+            <a:r>
+              <a:rPr lang="en-US" dirty="0"/>
+              <a:t>Subject 2</a:t>
+            </a:r>
+          </a:p>
+        </p:txBody>
+      </p:sp>
+      <p:sp>
+        <p:nvSpPr>
+          <p:cNvPr id="6" name="TextBox 5"/>
+          <p:cNvSpPr txBox="1"/>
+          <p:nvPr/>
+        </p:nvSpPr>
+        <p:spPr>
+          <a:xfrm>
+            <a:off x="1729946" y="934995"/>
+            <a:ext cx="7728398" cy="369332"/>
+          </a:xfrm>
+          <a:prstGeom prst="rect">
+            <a:avLst/>
+          </a:prstGeom>
+          <a:noFill/>
+        </p:spPr>
+        <p:txBody>
+          <a:bodyPr wrap="none" rtlCol="0">
+            <a:spAutoFit/>
+          </a:bodyPr>
+          <a:lstStyle/>
+          <a:p>
+            <a:r>
+              <a:rPr lang="en-US" dirty="0"/>
+              <a:t>40 Subjects x 2 sessions = 80 scans were pooled together for labeling</a:t>
             </a:r>
           </a:p>
         </p:txBody>
@@ -7819,7 +8250,7 @@
     </p:spTree>
     <p:extLst>
       <p:ext uri="{BB962C8B-B14F-4D97-AF65-F5344CB8AC3E}">
-        <p14:creationId xmlns:p14="http://schemas.microsoft.com/office/powerpoint/2010/main" val="3406988283"/>
+        <p14:creationId xmlns:p14="http://schemas.microsoft.com/office/powerpoint/2010/main" val="3642108323"/>
       </p:ext>
     </p:extLst>
   </p:cSld>
@@ -7863,7 +8294,7 @@
           <a:p>
             <a:r>
               <a:rPr lang="en-US" dirty="0"/>
-              <a:t>Other possibilities</a:t>
+              <a:t>Conclusion</a:t>
             </a:r>
           </a:p>
         </p:txBody>
@@ -7885,6 +8316,104 @@
           <a:p>
             <a:r>
               <a:rPr lang="en-US" dirty="0"/>
+              <a:t>Parameter free approach </a:t>
+            </a:r>
+          </a:p>
+          <a:p>
+            <a:r>
+              <a:rPr lang="en-US" dirty="0"/>
+              <a:t>Depends on only 2 simple assumptions</a:t>
+            </a:r>
+          </a:p>
+          <a:p>
+            <a:r>
+              <a:rPr lang="en-US" dirty="0"/>
+              <a:t>No Spatial Prior or group prior is assumed, regions can be very different as possible</a:t>
+            </a:r>
+          </a:p>
+          <a:p>
+            <a:endParaRPr lang="en-US" dirty="0"/>
+          </a:p>
+          <a:p>
+            <a:endParaRPr lang="en-US" dirty="0"/>
+          </a:p>
+          <a:p>
+            <a:r>
+              <a:rPr lang="en-US" dirty="0"/>
+              <a:t>Involves clustering of a large amount of data, so scalable algorithm is required (e.g. k-means)</a:t>
+            </a:r>
+          </a:p>
+        </p:txBody>
+      </p:sp>
+    </p:spTree>
+    <p:extLst>
+      <p:ext uri="{BB962C8B-B14F-4D97-AF65-F5344CB8AC3E}">
+        <p14:creationId xmlns:p14="http://schemas.microsoft.com/office/powerpoint/2010/main" val="3406988283"/>
+      </p:ext>
+    </p:extLst>
+  </p:cSld>
+  <p:clrMapOvr>
+    <a:masterClrMapping/>
+  </p:clrMapOvr>
+</p:sld>
+</file>
+
+<file path=ppt/slides/slide12.xml><?xml version="1.0" encoding="utf-8"?>
+<p:sld xmlns:a="http://schemas.openxmlformats.org/drawingml/2006/main" xmlns:r="http://schemas.openxmlformats.org/officeDocument/2006/relationships" xmlns:p="http://schemas.openxmlformats.org/presentationml/2006/main">
+  <p:cSld>
+    <p:spTree>
+      <p:nvGrpSpPr>
+        <p:cNvPr id="1" name=""/>
+        <p:cNvGrpSpPr/>
+        <p:nvPr/>
+      </p:nvGrpSpPr>
+      <p:grpSpPr>
+        <a:xfrm>
+          <a:off x="0" y="0"/>
+          <a:ext cx="0" cy="0"/>
+          <a:chOff x="0" y="0"/>
+          <a:chExt cx="0" cy="0"/>
+        </a:xfrm>
+      </p:grpSpPr>
+      <p:sp>
+        <p:nvSpPr>
+          <p:cNvPr id="2" name="Title 1"/>
+          <p:cNvSpPr>
+            <a:spLocks noGrp="1"/>
+          </p:cNvSpPr>
+          <p:nvPr>
+            <p:ph type="title"/>
+          </p:nvPr>
+        </p:nvSpPr>
+        <p:spPr/>
+        <p:txBody>
+          <a:bodyPr/>
+          <a:lstStyle/>
+          <a:p>
+            <a:r>
+              <a:rPr lang="en-US" dirty="0"/>
+              <a:t>Other Possibilities</a:t>
+            </a:r>
+          </a:p>
+        </p:txBody>
+      </p:sp>
+      <p:sp>
+        <p:nvSpPr>
+          <p:cNvPr id="3" name="Content Placeholder 2"/>
+          <p:cNvSpPr>
+            <a:spLocks noGrp="1"/>
+          </p:cNvSpPr>
+          <p:nvPr>
+            <p:ph idx="1"/>
+          </p:nvPr>
+        </p:nvSpPr>
+        <p:spPr/>
+        <p:txBody>
+          <a:bodyPr/>
+          <a:lstStyle/>
+          <a:p>
+            <a:r>
+              <a:rPr lang="en-US" dirty="0"/>
               <a:t>Group Studies</a:t>
             </a:r>
           </a:p>
@@ -7915,6 +8444,23 @@
             <a:r>
               <a:rPr lang="en-US" dirty="0"/>
               <a:t>Group Differences and other studies can be performed easily</a:t>
+            </a:r>
+          </a:p>
+          <a:p>
+            <a:pPr lvl="1"/>
+            <a:endParaRPr lang="en-US" dirty="0"/>
+          </a:p>
+          <a:p>
+            <a:pPr lvl="1"/>
+            <a:endParaRPr lang="en-US" dirty="0"/>
+          </a:p>
+          <a:p>
+            <a:pPr marL="57150" indent="0">
+              <a:buNone/>
+            </a:pPr>
+            <a:r>
+              <a:rPr lang="en-US" dirty="0"/>
+              <a:t>Will the results be same if correlation is used as a feature ?</a:t>
             </a:r>
           </a:p>
           <a:p>
@@ -7987,46 +8533,164 @@
           </a:p>
         </p:txBody>
       </p:sp>
-      <p:sp>
-        <p:nvSpPr>
-          <p:cNvPr id="3" name="Content Placeholder 2"/>
-          <p:cNvSpPr>
-            <a:spLocks noGrp="1"/>
-          </p:cNvSpPr>
-          <p:nvPr>
-            <p:ph idx="1"/>
-          </p:nvPr>
-        </p:nvSpPr>
-        <p:spPr/>
-        <p:txBody>
-          <a:bodyPr/>
-          <a:lstStyle/>
-          <a:p>
-            <a:r>
-              <a:rPr lang="en-US" dirty="0"/>
-              <a:t>We assume that:</a:t>
-            </a:r>
-          </a:p>
-          <a:p>
-            <a:pPr lvl="1"/>
-            <a:r>
-              <a:rPr lang="en-US" dirty="0"/>
-              <a:t>The time series are variance normalized</a:t>
-            </a:r>
-          </a:p>
-          <a:p>
-            <a:pPr lvl="1"/>
-            <a:r>
-              <a:rPr lang="en-US" dirty="0"/>
-              <a:t>The brains have similar overall correlation patterns</a:t>
-            </a:r>
-          </a:p>
-          <a:p>
-            <a:pPr lvl="1"/>
-            <a:endParaRPr lang="en-US" dirty="0"/>
-          </a:p>
-        </p:txBody>
-      </p:sp>
+      <mc:AlternateContent xmlns:mc="http://schemas.openxmlformats.org/markup-compatibility/2006">
+        <mc:Choice xmlns:a14="http://schemas.microsoft.com/office/drawing/2010/main" Requires="a14">
+          <p:sp>
+            <p:nvSpPr>
+              <p:cNvPr id="3" name="Content Placeholder 2"/>
+              <p:cNvSpPr>
+                <a:spLocks noGrp="1"/>
+              </p:cNvSpPr>
+              <p:nvPr>
+                <p:ph idx="1"/>
+              </p:nvPr>
+            </p:nvSpPr>
+            <p:spPr/>
+            <p:txBody>
+              <a:bodyPr/>
+              <a:lstStyle/>
+              <a:p>
+                <a:r>
+                  <a:rPr lang="en-US" dirty="0" err="1"/>
+                  <a:t>rsfMRI</a:t>
+                </a:r>
+                <a:r>
+                  <a:rPr lang="en-US" dirty="0"/>
+                  <a:t> signals are not directly comparable across subjects because they are out of sync.</a:t>
+                </a:r>
+              </a:p>
+              <a:p>
+                <a:endParaRPr lang="en-US" dirty="0"/>
+              </a:p>
+              <a:p>
+                <a:r>
+                  <a:rPr lang="en-US" dirty="0"/>
+                  <a:t>We assume that:</a:t>
+                </a:r>
+              </a:p>
+              <a:p>
+                <a:pPr lvl="1"/>
+                <a:r>
+                  <a:rPr lang="en-US" dirty="0"/>
+                  <a:t>The time series are variance normalized </a:t>
+                </a:r>
+              </a:p>
+              <a:p>
+                <a:pPr lvl="1"/>
+                <a:r>
+                  <a:rPr lang="en-US" dirty="0"/>
+                  <a:t>The brains have similar overall correlation patterns</a:t>
+                </a:r>
+              </a:p>
+              <a:p>
+                <a:pPr lvl="1"/>
+                <a:endParaRPr lang="en-US" dirty="0"/>
+              </a:p>
+              <a:p>
+                <a:pPr marL="457200" lvl="1" indent="0">
+                  <a:buNone/>
+                </a:pPr>
+                <a:endParaRPr lang="en-US" dirty="0"/>
+              </a:p>
+              <a:p>
+                <a:pPr marL="457200" lvl="1" indent="0">
+                  <a:buNone/>
+                </a:pPr>
+                <a:r>
+                  <a:rPr lang="en-US" dirty="0"/>
+                  <a:t>The time series with T-samples can be represented as a point on sphere </a:t>
+                </a:r>
+                <a14:m>
+                  <m:oMath xmlns:m="http://schemas.openxmlformats.org/officeDocument/2006/math">
+                    <m:sSup>
+                      <m:sSupPr>
+                        <m:ctrlPr>
+                          <a:rPr lang="en-US" b="0" i="1" smtClean="0">
+                            <a:latin typeface="Cambria Math" panose="02040503050406030204" pitchFamily="18" charset="0"/>
+                          </a:rPr>
+                        </m:ctrlPr>
+                      </m:sSupPr>
+                      <m:e>
+                        <m:r>
+                          <a:rPr lang="en-US" b="0" i="1" smtClean="0">
+                            <a:latin typeface="Cambria Math" panose="02040503050406030204" pitchFamily="18" charset="0"/>
+                          </a:rPr>
+                          <m:t>𝑆</m:t>
+                        </m:r>
+                      </m:e>
+                      <m:sup>
+                        <m:r>
+                          <a:rPr lang="en-US" b="0" i="1" smtClean="0">
+                            <a:latin typeface="Cambria Math" panose="02040503050406030204" pitchFamily="18" charset="0"/>
+                          </a:rPr>
+                          <m:t>𝑇</m:t>
+                        </m:r>
+                        <m:r>
+                          <a:rPr lang="en-US" b="0" i="1" smtClean="0">
+                            <a:latin typeface="Cambria Math" panose="02040503050406030204" pitchFamily="18" charset="0"/>
+                          </a:rPr>
+                          <m:t>−1</m:t>
+                        </m:r>
+                      </m:sup>
+                    </m:sSup>
+                  </m:oMath>
+                </a14:m>
+                <a:r>
+                  <a:rPr lang="en-US" dirty="0"/>
+                  <a:t>.</a:t>
+                </a:r>
+              </a:p>
+              <a:p>
+                <a:pPr marL="457200" lvl="1" indent="0">
+                  <a:buNone/>
+                </a:pPr>
+                <a:endParaRPr lang="en-US" dirty="0"/>
+              </a:p>
+              <a:p>
+                <a:pPr lvl="1"/>
+                <a:endParaRPr lang="en-US" dirty="0"/>
+              </a:p>
+              <a:p>
+                <a:pPr lvl="1"/>
+                <a:endParaRPr lang="en-US" dirty="0"/>
+              </a:p>
+            </p:txBody>
+          </p:sp>
+        </mc:Choice>
+        <mc:Fallback>
+          <p:sp>
+            <p:nvSpPr>
+              <p:cNvPr id="3" name="Content Placeholder 2"/>
+              <p:cNvSpPr>
+                <a:spLocks noGrp="1" noRot="1" noChangeAspect="1" noMove="1" noResize="1" noEditPoints="1" noAdjustHandles="1" noChangeArrowheads="1" noChangeShapeType="1" noTextEdit="1"/>
+              </p:cNvSpPr>
+              <p:nvPr>
+                <p:ph idx="1"/>
+              </p:nvPr>
+            </p:nvSpPr>
+            <p:spPr>
+              <a:blipFill>
+                <a:blip r:embed="rId2"/>
+                <a:stretch>
+                  <a:fillRect l="-479" t="-806" r="-1094"/>
+                </a:stretch>
+              </a:blipFill>
+            </p:spPr>
+            <p:txBody>
+              <a:bodyPr/>
+              <a:lstStyle/>
+              <a:p>
+                <a:r>
+                  <a:rPr lang="en-US">
+                    <a:noFill/>
+                  </a:rPr>
+                  <a:t> </a:t>
+                </a:r>
+              </a:p>
+            </p:txBody>
+          </p:sp>
+        </mc:Fallback>
+      </mc:AlternateContent>
     </p:spTree>
     <p:extLst>
       <p:ext uri="{BB962C8B-B14F-4D97-AF65-F5344CB8AC3E}">
@@ -8068,6 +8732,15 @@
         <p:blipFill rotWithShape="1">
           <a:blip r:embed="rId2">
             <a:extLst>
+              <a:ext uri="{BEBA8EAE-BF5A-486C-A8C5-ECC9F3942E4B}">
+                <a14:imgProps xmlns:a14="http://schemas.microsoft.com/office/drawing/2010/main">
+                  <a14:imgLayer r:embed="rId3">
+                    <a14:imgEffect>
+                      <a14:backgroundRemoval t="17785" b="81301" l="34063" r="65625"/>
+                    </a14:imgEffect>
+                  </a14:imgLayer>
+                </a14:imgProps>
+              </a:ext>
               <a:ext uri="{28A0092B-C50C-407E-A947-70E740481C1C}">
                 <a14:useLocalDpi xmlns:a14="http://schemas.microsoft.com/office/drawing/2010/main" val="0"/>
               </a:ext>
@@ -8078,7 +8751,7 @@
         </p:blipFill>
         <p:spPr>
           <a:xfrm>
-            <a:off x="8205536" y="1905000"/>
+            <a:off x="8212000" y="1905000"/>
             <a:ext cx="3489158" cy="3545434"/>
           </a:xfrm>
           <a:prstGeom prst="rect">
@@ -8099,7 +8772,7 @@
         <p:spPr>
           <a:xfrm>
             <a:off x="1687670" y="624110"/>
-            <a:ext cx="4038876" cy="1280890"/>
+            <a:ext cx="6261844" cy="611566"/>
           </a:xfrm>
         </p:spPr>
         <p:txBody>
@@ -8117,59 +8790,47 @@
       </p:sp>
       <p:sp>
         <p:nvSpPr>
-          <p:cNvPr id="3" name="Content Placeholder 2"/>
-          <p:cNvSpPr>
-            <a:spLocks noGrp="1"/>
-          </p:cNvSpPr>
-          <p:nvPr>
-            <p:ph idx="1"/>
-          </p:nvPr>
-        </p:nvSpPr>
-        <p:spPr>
-          <a:xfrm>
-            <a:off x="1683956" y="2133600"/>
-            <a:ext cx="4042589" cy="3777622"/>
-          </a:xfrm>
-        </p:spPr>
-        <p:txBody>
-          <a:bodyPr>
-            <a:normAutofit/>
-          </a:bodyPr>
-          <a:lstStyle/>
-          <a:p>
-            <a:r>
-              <a:rPr lang="en-US" sz="1600">
-                <a:solidFill>
-                  <a:srgbClr val="000000"/>
-                </a:solidFill>
-              </a:rPr>
-              <a:t>Variance Normalized signals </a:t>
-            </a:r>
-          </a:p>
-          <a:p>
-            <a:endParaRPr lang="en-US" sz="1600">
-              <a:solidFill>
-                <a:srgbClr val="000000"/>
-              </a:solidFill>
-            </a:endParaRPr>
-          </a:p>
-        </p:txBody>
-      </p:sp>
-      <p:sp>
-        <p:nvSpPr>
-          <p:cNvPr id="8" name="Rectangle 7"/>
-          <p:cNvSpPr/>
+          <p:cNvPr id="9" name="TextBox 8"/>
+          <p:cNvSpPr txBox="1"/>
           <p:nvPr/>
         </p:nvSpPr>
         <p:spPr>
           <a:xfrm>
-            <a:off x="8205537" y="1905000"/>
-            <a:ext cx="3489158" cy="3545434"/>
+            <a:off x="10485959" y="3348672"/>
+            <a:ext cx="306367" cy="369332"/>
           </a:xfrm>
           <a:prstGeom prst="rect">
             <a:avLst/>
           </a:prstGeom>
           <a:noFill/>
+        </p:spPr>
+        <p:txBody>
+          <a:bodyPr wrap="square" rtlCol="0">
+            <a:spAutoFit/>
+          </a:bodyPr>
+          <a:lstStyle/>
+          <a:p>
+            <a:r>
+              <a:rPr lang="en-US" dirty="0"/>
+              <a:t>Y</a:t>
+            </a:r>
+          </a:p>
+        </p:txBody>
+      </p:sp>
+      <p:sp>
+        <p:nvSpPr>
+          <p:cNvPr id="6" name="Block Arc 5"/>
+          <p:cNvSpPr/>
+          <p:nvPr/>
+        </p:nvSpPr>
+        <p:spPr>
+          <a:xfrm rot="2208257">
+            <a:off x="10488252" y="2312091"/>
+            <a:ext cx="1121155" cy="294840"/>
+          </a:xfrm>
+          <a:prstGeom prst="blockArc">
+            <a:avLst/>
+          </a:prstGeom>
         </p:spPr>
         <p:style>
           <a:lnRef idx="2">
@@ -8192,10 +8853,547 @@
           <a:lstStyle/>
           <a:p>
             <a:pPr algn="ctr"/>
-            <a:endParaRPr lang="en-US"/>
-          </a:p>
-        </p:txBody>
-      </p:sp>
+            <a:endParaRPr lang="en-US" dirty="0">
+              <a:solidFill>
+                <a:schemeClr val="tx1"/>
+              </a:solidFill>
+            </a:endParaRPr>
+          </a:p>
+        </p:txBody>
+      </p:sp>
+      <p:sp>
+        <p:nvSpPr>
+          <p:cNvPr id="10" name="TextBox 9"/>
+          <p:cNvSpPr txBox="1"/>
+          <p:nvPr/>
+        </p:nvSpPr>
+        <p:spPr>
+          <a:xfrm>
+            <a:off x="11085374" y="2090179"/>
+            <a:ext cx="343364" cy="369332"/>
+          </a:xfrm>
+          <a:prstGeom prst="rect">
+            <a:avLst/>
+          </a:prstGeom>
+          <a:noFill/>
+        </p:spPr>
+        <p:txBody>
+          <a:bodyPr wrap="none" rtlCol="0">
+            <a:spAutoFit/>
+          </a:bodyPr>
+          <a:lstStyle/>
+          <a:p>
+            <a:r>
+              <a:rPr lang="en-US" dirty="0"/>
+              <a:t>d</a:t>
+            </a:r>
+          </a:p>
+        </p:txBody>
+      </p:sp>
+      <p:grpSp>
+        <p:nvGrpSpPr>
+          <p:cNvPr id="16" name="Group 15"/>
+          <p:cNvGrpSpPr/>
+          <p:nvPr/>
+        </p:nvGrpSpPr>
+        <p:grpSpPr>
+          <a:xfrm>
+            <a:off x="1484128" y="1482298"/>
+            <a:ext cx="8635316" cy="2585323"/>
+            <a:chOff x="1484128" y="1482298"/>
+            <a:chExt cx="8635316" cy="2585323"/>
+          </a:xfrm>
+        </p:grpSpPr>
+        <mc:AlternateContent xmlns:mc="http://schemas.openxmlformats.org/markup-compatibility/2006" xmlns:a14="http://schemas.microsoft.com/office/drawing/2010/main">
+          <mc:Choice Requires="a14">
+            <p:sp>
+              <p:nvSpPr>
+                <p:cNvPr id="13" name="TextBox 12"/>
+                <p:cNvSpPr txBox="1"/>
+                <p:nvPr/>
+              </p:nvSpPr>
+              <p:spPr>
+                <a:xfrm>
+                  <a:off x="1484128" y="1482298"/>
+                  <a:ext cx="6612708" cy="2585323"/>
+                </a:xfrm>
+                <a:prstGeom prst="rect">
+                  <a:avLst/>
+                </a:prstGeom>
+                <a:noFill/>
+              </p:spPr>
+              <p:txBody>
+                <a:bodyPr wrap="none" rtlCol="0">
+                  <a:spAutoFit/>
+                </a:bodyPr>
+                <a:lstStyle/>
+                <a:p>
+                  <a:pPr marL="285750" indent="-285750">
+                    <a:buFont typeface="Arial" panose="020B0604020202020204" pitchFamily="34" charset="0"/>
+                    <a:buChar char="•"/>
+                  </a:pPr>
+                  <a:r>
+                    <a:rPr lang="en-US" dirty="0"/>
+                    <a:t>We assume that all the time series are equally likely, i.e.</a:t>
+                  </a:r>
+                </a:p>
+                <a:p>
+                  <a:r>
+                    <a:rPr lang="en-US" dirty="0"/>
+                    <a:t>the sphere has uniform metric</a:t>
+                  </a:r>
+                </a:p>
+                <a:p>
+                  <a:endParaRPr lang="en-US" dirty="0"/>
+                </a:p>
+                <a:p>
+                  <a:endParaRPr lang="en-US" dirty="0"/>
+                </a:p>
+                <a:p>
+                  <a:pPr marL="285750" indent="-285750">
+                    <a:buFont typeface="Arial" panose="020B0604020202020204" pitchFamily="34" charset="0"/>
+                    <a:buChar char="•"/>
+                  </a:pPr>
+                  <a:r>
+                    <a:rPr lang="en-US" dirty="0"/>
+                    <a:t>The distance between two time series is given by</a:t>
+                  </a:r>
+                </a:p>
+                <a:p>
+                  <a:pPr marL="285750" indent="-285750">
+                    <a:buFont typeface="Arial" panose="020B0604020202020204" pitchFamily="34" charset="0"/>
+                    <a:buChar char="•"/>
+                  </a:pPr>
+                  <a:endParaRPr lang="en-US" dirty="0"/>
+                </a:p>
+                <a:p>
+                  <a:pPr marL="285750" indent="-285750">
+                    <a:buFont typeface="Arial" panose="020B0604020202020204" pitchFamily="34" charset="0"/>
+                    <a:buChar char="•"/>
+                  </a:pPr>
+                  <a:endParaRPr lang="en-US" dirty="0"/>
+                </a:p>
+                <a:p>
+                  <a:pPr marL="285750" indent="-285750">
+                    <a:buFont typeface="Arial" panose="020B0604020202020204" pitchFamily="34" charset="0"/>
+                    <a:buChar char="•"/>
+                  </a:pPr>
+                  <a:endParaRPr lang="en-US" dirty="0"/>
+                </a:p>
+                <a:p>
+                  <a:r>
+                    <a:rPr lang="en-US" dirty="0"/>
+                    <a:t>where </a:t>
+                  </a:r>
+                  <a14:m>
+                    <m:oMath xmlns:m="http://schemas.openxmlformats.org/officeDocument/2006/math">
+                      <m:sSub>
+                        <m:sSubPr>
+                          <m:ctrlPr>
+                            <a:rPr lang="en-US" b="0" i="1" smtClean="0">
+                              <a:latin typeface="Cambria Math" panose="02040503050406030204" pitchFamily="18" charset="0"/>
+                            </a:rPr>
+                          </m:ctrlPr>
+                        </m:sSubPr>
+                        <m:e>
+                          <m:r>
+                            <a:rPr lang="en-US" b="0" i="1" smtClean="0">
+                              <a:latin typeface="Cambria Math" panose="02040503050406030204" pitchFamily="18" charset="0"/>
+                            </a:rPr>
+                            <m:t>𝜌</m:t>
+                          </m:r>
+                        </m:e>
+                        <m:sub>
+                          <m:r>
+                            <a:rPr lang="en-US" b="0" i="1" smtClean="0">
+                              <a:latin typeface="Cambria Math" panose="02040503050406030204" pitchFamily="18" charset="0"/>
+                            </a:rPr>
+                            <m:t>𝑋𝑌</m:t>
+                          </m:r>
+                        </m:sub>
+                      </m:sSub>
+                    </m:oMath>
+                  </a14:m>
+                  <a:r>
+                    <a:rPr lang="en-US" dirty="0"/>
+                    <a:t> is correlation between </a:t>
+                  </a:r>
+                  <a14:m>
+                    <m:oMath xmlns:m="http://schemas.openxmlformats.org/officeDocument/2006/math">
+                      <m:r>
+                        <a:rPr lang="en-US" b="0" i="1" smtClean="0">
+                          <a:latin typeface="Cambria Math" panose="02040503050406030204" pitchFamily="18" charset="0"/>
+                        </a:rPr>
+                        <m:t>𝑋</m:t>
+                      </m:r>
+                    </m:oMath>
+                  </a14:m>
+                  <a:r>
+                    <a:rPr lang="en-US" dirty="0"/>
+                    <a:t> and </a:t>
+                  </a:r>
+                  <a14:m>
+                    <m:oMath xmlns:m="http://schemas.openxmlformats.org/officeDocument/2006/math">
+                      <m:r>
+                        <a:rPr lang="en-US" b="0" i="1" smtClean="0">
+                          <a:latin typeface="Cambria Math" panose="02040503050406030204" pitchFamily="18" charset="0"/>
+                        </a:rPr>
+                        <m:t>𝑌</m:t>
+                      </m:r>
+                    </m:oMath>
+                  </a14:m>
+                  <a:r>
+                    <a:rPr lang="en-US" dirty="0"/>
+                    <a:t>.</a:t>
+                  </a:r>
+                </a:p>
+              </p:txBody>
+            </p:sp>
+          </mc:Choice>
+          <mc:Fallback xmlns="">
+            <p:sp>
+              <p:nvSpPr>
+                <p:cNvPr id="13" name="TextBox 12"/>
+                <p:cNvSpPr txBox="1">
+                  <a:spLocks noRot="1" noChangeAspect="1" noMove="1" noResize="1" noEditPoints="1" noAdjustHandles="1" noChangeArrowheads="1" noChangeShapeType="1" noTextEdit="1"/>
+                </p:cNvSpPr>
+                <p:nvPr/>
+              </p:nvSpPr>
+              <p:spPr>
+                <a:xfrm>
+                  <a:off x="1484128" y="1482298"/>
+                  <a:ext cx="6612708" cy="2585323"/>
+                </a:xfrm>
+                <a:prstGeom prst="rect">
+                  <a:avLst/>
+                </a:prstGeom>
+                <a:blipFill>
+                  <a:blip r:embed="rId4"/>
+                  <a:stretch>
+                    <a:fillRect l="-737" t="-1179" r="-92" b="-2830"/>
+                  </a:stretch>
+                </a:blipFill>
+              </p:spPr>
+              <p:txBody>
+                <a:bodyPr/>
+                <a:lstStyle/>
+                <a:p>
+                  <a:r>
+                    <a:rPr lang="en-US">
+                      <a:noFill/>
+                    </a:rPr>
+                    <a:t> </a:t>
+                  </a:r>
+                </a:p>
+              </p:txBody>
+            </p:sp>
+          </mc:Fallback>
+        </mc:AlternateContent>
+        <p:sp>
+          <p:nvSpPr>
+            <p:cNvPr id="4" name="TextBox 3"/>
+            <p:cNvSpPr txBox="1"/>
+            <p:nvPr/>
+          </p:nvSpPr>
+          <p:spPr>
+            <a:xfrm>
+              <a:off x="9793714" y="2947738"/>
+              <a:ext cx="325730" cy="369332"/>
+            </a:xfrm>
+            <a:prstGeom prst="rect">
+              <a:avLst/>
+            </a:prstGeom>
+            <a:noFill/>
+          </p:spPr>
+          <p:txBody>
+            <a:bodyPr wrap="none" rtlCol="0">
+              <a:spAutoFit/>
+            </a:bodyPr>
+            <a:lstStyle/>
+            <a:p>
+              <a:r>
+                <a:rPr lang="en-US" dirty="0"/>
+                <a:t>X</a:t>
+              </a:r>
+            </a:p>
+          </p:txBody>
+        </p:sp>
+        <mc:AlternateContent xmlns:mc="http://schemas.openxmlformats.org/markup-compatibility/2006" xmlns:a14="http://schemas.microsoft.com/office/drawing/2010/main">
+          <mc:Choice Requires="a14">
+            <p:sp>
+              <p:nvSpPr>
+                <p:cNvPr id="12" name="TextBox 11"/>
+                <p:cNvSpPr txBox="1"/>
+                <p:nvPr/>
+              </p:nvSpPr>
+              <p:spPr>
+                <a:xfrm>
+                  <a:off x="3351714" y="3071673"/>
+                  <a:ext cx="1612172" cy="276999"/>
+                </a:xfrm>
+                <a:prstGeom prst="rect">
+                  <a:avLst/>
+                </a:prstGeom>
+                <a:noFill/>
+              </p:spPr>
+              <p:txBody>
+                <a:bodyPr wrap="none" lIns="0" tIns="0" rIns="0" bIns="0" rtlCol="0">
+                  <a:spAutoFit/>
+                </a:bodyPr>
+                <a:lstStyle/>
+                <a:p>
+                  <a:pPr/>
+                  <a14:m>
+                    <m:oMathPara xmlns:m="http://schemas.openxmlformats.org/officeDocument/2006/math">
+                      <m:oMathParaPr>
+                        <m:jc m:val="centerGroup"/>
+                      </m:oMathParaPr>
+                      <m:oMath xmlns:m="http://schemas.openxmlformats.org/officeDocument/2006/math">
+                        <m:r>
+                          <a:rPr lang="en-US" b="0" i="1" smtClean="0">
+                            <a:latin typeface="Cambria Math" panose="02040503050406030204" pitchFamily="18" charset="0"/>
+                          </a:rPr>
+                          <m:t>𝑑</m:t>
+                        </m:r>
+                        <m:r>
+                          <a:rPr lang="en-US" b="0" i="1" smtClean="0">
+                            <a:latin typeface="Cambria Math" panose="02040503050406030204" pitchFamily="18" charset="0"/>
+                          </a:rPr>
+                          <m:t>=</m:t>
+                        </m:r>
+                        <m:func>
+                          <m:funcPr>
+                            <m:ctrlPr>
+                              <a:rPr lang="en-US" b="0" i="1" smtClean="0">
+                                <a:latin typeface="Cambria Math" panose="02040503050406030204" pitchFamily="18" charset="0"/>
+                              </a:rPr>
+                            </m:ctrlPr>
+                          </m:funcPr>
+                          <m:fName>
+                            <m:sSup>
+                              <m:sSupPr>
+                                <m:ctrlPr>
+                                  <a:rPr lang="en-US" b="0" i="1" smtClean="0">
+                                    <a:latin typeface="Cambria Math" panose="02040503050406030204" pitchFamily="18" charset="0"/>
+                                  </a:rPr>
+                                </m:ctrlPr>
+                              </m:sSupPr>
+                              <m:e>
+                                <m:r>
+                                  <m:rPr>
+                                    <m:sty m:val="p"/>
+                                  </m:rPr>
+                                  <a:rPr lang="en-US" b="0" i="0" smtClean="0">
+                                    <a:latin typeface="Cambria Math" panose="02040503050406030204" pitchFamily="18" charset="0"/>
+                                  </a:rPr>
+                                  <m:t>cos</m:t>
+                                </m:r>
+                              </m:e>
+                              <m:sup>
+                                <m:r>
+                                  <a:rPr lang="en-US" b="0" i="1" smtClean="0">
+                                    <a:latin typeface="Cambria Math" panose="02040503050406030204" pitchFamily="18" charset="0"/>
+                                  </a:rPr>
+                                  <m:t>−1</m:t>
+                                </m:r>
+                              </m:sup>
+                            </m:sSup>
+                          </m:fName>
+                          <m:e>
+                            <m:r>
+                              <a:rPr lang="en-US" b="0" i="1" smtClean="0">
+                                <a:latin typeface="Cambria Math" panose="02040503050406030204" pitchFamily="18" charset="0"/>
+                              </a:rPr>
+                              <m:t>(</m:t>
+                            </m:r>
+                            <m:sSub>
+                              <m:sSubPr>
+                                <m:ctrlPr>
+                                  <a:rPr lang="en-US" b="0" i="1" smtClean="0">
+                                    <a:latin typeface="Cambria Math" panose="02040503050406030204" pitchFamily="18" charset="0"/>
+                                  </a:rPr>
+                                </m:ctrlPr>
+                              </m:sSubPr>
+                              <m:e>
+                                <m:r>
+                                  <a:rPr lang="en-US" b="0" i="1" smtClean="0">
+                                    <a:latin typeface="Cambria Math" panose="02040503050406030204" pitchFamily="18" charset="0"/>
+                                  </a:rPr>
+                                  <m:t>𝜌</m:t>
+                                </m:r>
+                              </m:e>
+                              <m:sub>
+                                <m:r>
+                                  <a:rPr lang="en-US" b="0" i="1" smtClean="0">
+                                    <a:latin typeface="Cambria Math" panose="02040503050406030204" pitchFamily="18" charset="0"/>
+                                  </a:rPr>
+                                  <m:t>𝑋𝑌</m:t>
+                                </m:r>
+                              </m:sub>
+                            </m:sSub>
+                            <m:r>
+                              <a:rPr lang="en-US" b="0" i="1" smtClean="0">
+                                <a:latin typeface="Cambria Math" panose="02040503050406030204" pitchFamily="18" charset="0"/>
+                              </a:rPr>
+                              <m:t>)</m:t>
+                            </m:r>
+                          </m:e>
+                        </m:func>
+                      </m:oMath>
+                    </m:oMathPara>
+                  </a14:m>
+                  <a:endParaRPr lang="en-US" dirty="0"/>
+                </a:p>
+              </p:txBody>
+            </p:sp>
+          </mc:Choice>
+          <mc:Fallback xmlns="">
+            <p:sp>
+              <p:nvSpPr>
+                <p:cNvPr id="12" name="TextBox 11"/>
+                <p:cNvSpPr txBox="1">
+                  <a:spLocks noRot="1" noChangeAspect="1" noMove="1" noResize="1" noEditPoints="1" noAdjustHandles="1" noChangeArrowheads="1" noChangeShapeType="1" noTextEdit="1"/>
+                </p:cNvSpPr>
+                <p:nvPr/>
+              </p:nvSpPr>
+              <p:spPr>
+                <a:xfrm>
+                  <a:off x="3351714" y="3071673"/>
+                  <a:ext cx="1612172" cy="276999"/>
+                </a:xfrm>
+                <a:prstGeom prst="rect">
+                  <a:avLst/>
+                </a:prstGeom>
+                <a:blipFill>
+                  <a:blip r:embed="rId5"/>
+                  <a:stretch>
+                    <a:fillRect l="-3030" r="-4924" b="-40000"/>
+                  </a:stretch>
+                </a:blipFill>
+              </p:spPr>
+              <p:txBody>
+                <a:bodyPr/>
+                <a:lstStyle/>
+                <a:p>
+                  <a:r>
+                    <a:rPr lang="en-US">
+                      <a:noFill/>
+                    </a:rPr>
+                    <a:t> </a:t>
+                  </a:r>
+                </a:p>
+              </p:txBody>
+            </p:sp>
+          </mc:Fallback>
+        </mc:AlternateContent>
+      </p:grpSp>
+      <mc:AlternateContent xmlns:mc="http://schemas.openxmlformats.org/markup-compatibility/2006">
+        <mc:Choice xmlns:a14="http://schemas.microsoft.com/office/drawing/2010/main" Requires="a14">
+          <p:sp>
+            <p:nvSpPr>
+              <p:cNvPr id="3" name="Rectangle 2"/>
+              <p:cNvSpPr/>
+              <p:nvPr/>
+            </p:nvSpPr>
+            <p:spPr>
+              <a:xfrm>
+                <a:off x="9596160" y="1535668"/>
+                <a:ext cx="720838" cy="369332"/>
+              </a:xfrm>
+              <a:prstGeom prst="rect">
+                <a:avLst/>
+              </a:prstGeom>
+            </p:spPr>
+            <p:txBody>
+              <a:bodyPr wrap="none">
+                <a:spAutoFit/>
+              </a:bodyPr>
+              <a:lstStyle/>
+              <a:p>
+                <a14:m>
+                  <m:oMathPara xmlns:m="http://schemas.openxmlformats.org/officeDocument/2006/math">
+                    <m:oMathParaPr>
+                      <m:jc m:val="centerGroup"/>
+                    </m:oMathParaPr>
+                    <m:oMath xmlns:m="http://schemas.openxmlformats.org/officeDocument/2006/math">
+                      <m:sSup>
+                        <m:sSupPr>
+                          <m:ctrlPr>
+                            <a:rPr lang="en-US" i="1">
+                              <a:latin typeface="Cambria Math" panose="02040503050406030204" pitchFamily="18" charset="0"/>
+                            </a:rPr>
+                          </m:ctrlPr>
+                        </m:sSupPr>
+                        <m:e>
+                          <m:r>
+                            <a:rPr lang="en-US" i="1">
+                              <a:latin typeface="Cambria Math" panose="02040503050406030204" pitchFamily="18" charset="0"/>
+                            </a:rPr>
+                            <m:t>𝑆</m:t>
+                          </m:r>
+                        </m:e>
+                        <m:sup>
+                          <m:r>
+                            <a:rPr lang="en-US" i="1">
+                              <a:latin typeface="Cambria Math" panose="02040503050406030204" pitchFamily="18" charset="0"/>
+                            </a:rPr>
+                            <m:t>𝑇</m:t>
+                          </m:r>
+                          <m:r>
+                            <a:rPr lang="en-US" i="1">
+                              <a:latin typeface="Cambria Math" panose="02040503050406030204" pitchFamily="18" charset="0"/>
+                            </a:rPr>
+                            <m:t>−1</m:t>
+                          </m:r>
+                        </m:sup>
+                      </m:sSup>
+                    </m:oMath>
+                  </m:oMathPara>
+                </a14:m>
+                <a:endParaRPr lang="en-US" dirty="0"/>
+              </a:p>
+            </p:txBody>
+          </p:sp>
+        </mc:Choice>
+        <mc:Fallback>
+          <p:sp>
+            <p:nvSpPr>
+              <p:cNvPr id="3" name="Rectangle 2"/>
+              <p:cNvSpPr>
+                <a:spLocks noRot="1" noChangeAspect="1" noMove="1" noResize="1" noEditPoints="1" noAdjustHandles="1" noChangeArrowheads="1" noChangeShapeType="1" noTextEdit="1"/>
+              </p:cNvSpPr>
+              <p:nvPr/>
+            </p:nvSpPr>
+            <p:spPr>
+              <a:xfrm>
+                <a:off x="9596160" y="1535668"/>
+                <a:ext cx="720838" cy="369332"/>
+              </a:xfrm>
+              <a:prstGeom prst="rect">
+                <a:avLst/>
+              </a:prstGeom>
+              <a:blipFill>
+                <a:blip r:embed="rId6"/>
+                <a:stretch>
+                  <a:fillRect/>
+                </a:stretch>
+              </a:blipFill>
+            </p:spPr>
+            <p:txBody>
+              <a:bodyPr/>
+              <a:lstStyle/>
+              <a:p>
+                <a:r>
+                  <a:rPr lang="en-US">
+                    <a:noFill/>
+                  </a:rPr>
+                  <a:t> </a:t>
+                </a:r>
+              </a:p>
+            </p:txBody>
+          </p:sp>
+        </mc:Fallback>
+      </mc:AlternateContent>
     </p:spTree>
     <p:extLst>
       <p:ext uri="{BB962C8B-B14F-4D97-AF65-F5344CB8AC3E}">
@@ -8228,7 +9426,7 @@
       </p:grpSpPr>
       <p:sp useBgFill="1">
         <p:nvSpPr>
-          <p:cNvPr id="7" name="Rectangle 6"/>
+          <p:cNvPr id="13" name="Rectangle 12"/>
           <p:cNvSpPr>
             <a:spLocks noGrp="1" noRot="1" noChangeAspect="1" noMove="1" noResize="1" noEditPoints="1" noAdjustHandles="1" noChangeArrowheads="1" noChangeShapeType="1" noTextEdit="1"/>
           </p:cNvSpPr>
@@ -8279,64 +9477,7 @@
       </p:sp>
       <p:sp>
         <p:nvSpPr>
-          <p:cNvPr id="8" name="Rectangle 7"/>
-          <p:cNvSpPr>
-            <a:spLocks noGrp="1" noRot="1" noChangeAspect="1" noMove="1" noResize="1" noEditPoints="1" noAdjustHandles="1" noChangeArrowheads="1" noChangeShapeType="1" noTextEdit="1"/>
-          </p:cNvSpPr>
-          <p:nvPr>
-            <p:extLst>
-              <p:ext uri="{386F3935-93C4-4BCD-93E2-E3B085C9AB24}">
-                <p16:designElem xmlns:p16="http://schemas.microsoft.com/office/powerpoint/2015/main" val="1"/>
-              </p:ext>
-            </p:extLst>
-          </p:nvPr>
-        </p:nvSpPr>
-        <p:spPr>
-          <a:xfrm>
-            <a:off x="4619543" y="645106"/>
-            <a:ext cx="6953577" cy="5247747"/>
-          </a:xfrm>
-          <a:prstGeom prst="rect">
-            <a:avLst/>
-          </a:prstGeom>
-          <a:solidFill>
-            <a:srgbClr val="FFFFFE"/>
-          </a:solidFill>
-          <a:ln w="12700" cap="sq">
-            <a:solidFill>
-              <a:schemeClr val="tx2"/>
-            </a:solidFill>
-            <a:miter lim="800000"/>
-          </a:ln>
-        </p:spPr>
-        <p:style>
-          <a:lnRef idx="2">
-            <a:schemeClr val="accent1">
-              <a:shade val="50000"/>
-            </a:schemeClr>
-          </a:lnRef>
-          <a:fillRef idx="1">
-            <a:schemeClr val="accent1"/>
-          </a:fillRef>
-          <a:effectRef idx="0">
-            <a:schemeClr val="accent1"/>
-          </a:effectRef>
-          <a:fontRef idx="minor">
-            <a:schemeClr val="lt1"/>
-          </a:fontRef>
-        </p:style>
-        <p:txBody>
-          <a:bodyPr rtlCol="0" anchor="ctr"/>
-          <a:lstStyle/>
-          <a:p>
-            <a:pPr algn="ctr"/>
-            <a:endParaRPr lang="en-US"/>
-          </a:p>
-        </p:txBody>
-      </p:sp>
-      <p:sp>
-        <p:nvSpPr>
-          <p:cNvPr id="9" name="Rectangle 8"/>
+          <p:cNvPr id="14" name="Rectangle 13"/>
           <p:cNvSpPr>
             <a:spLocks noGrp="1" noRot="1" noChangeAspect="1" noMove="1" noResize="1" noEditPoints="1" noAdjustHandles="1" noChangeArrowheads="1" noChangeShapeType="1" noTextEdit="1"/>
           </p:cNvSpPr>
@@ -8381,7 +9522,7 @@
       </p:sp>
       <p:sp>
         <p:nvSpPr>
-          <p:cNvPr id="10" name="Freeform 11"/>
+          <p:cNvPr id="15" name="Freeform 11"/>
           <p:cNvSpPr>
             <a:spLocks noGrp="1" noRot="1" noChangeAspect="1" noMove="1" noResize="1" noEditPoints="1" noAdjustHandles="1" noChangeArrowheads="1" noChangeShapeType="1" noTextEdit="1"/>
           </p:cNvSpPr>
@@ -8587,66 +9728,6 @@
           </a:p>
         </p:txBody>
       </p:sp>
-      <p:pic>
-        <p:nvPicPr>
-          <p:cNvPr id="4" name="Picture 3"/>
-          <p:cNvPicPr>
-            <a:picLocks noChangeAspect="1"/>
-          </p:cNvPicPr>
-          <p:nvPr/>
-        </p:nvPicPr>
-        <p:blipFill>
-          <a:blip r:embed="rId2">
-            <a:extLst>
-              <a:ext uri="{28A0092B-C50C-407E-A947-70E740481C1C}">
-                <a14:useLocalDpi xmlns:a14="http://schemas.microsoft.com/office/drawing/2010/main" val="0"/>
-              </a:ext>
-            </a:extLst>
-          </a:blip>
-          <a:stretch>
-            <a:fillRect/>
-          </a:stretch>
-        </p:blipFill>
-        <p:spPr>
-          <a:xfrm>
-            <a:off x="4783269" y="1641171"/>
-            <a:ext cx="3231199" cy="3255616"/>
-          </a:xfrm>
-          <a:prstGeom prst="rect">
-            <a:avLst/>
-          </a:prstGeom>
-        </p:spPr>
-      </p:pic>
-      <p:pic>
-        <p:nvPicPr>
-          <p:cNvPr id="5" name="Picture 4"/>
-          <p:cNvPicPr>
-            <a:picLocks noChangeAspect="1"/>
-          </p:cNvPicPr>
-          <p:nvPr/>
-        </p:nvPicPr>
-        <p:blipFill>
-          <a:blip r:embed="rId3">
-            <a:extLst>
-              <a:ext uri="{28A0092B-C50C-407E-A947-70E740481C1C}">
-                <a14:useLocalDpi xmlns:a14="http://schemas.microsoft.com/office/drawing/2010/main" val="0"/>
-              </a:ext>
-            </a:extLst>
-          </a:blip>
-          <a:stretch>
-            <a:fillRect/>
-          </a:stretch>
-        </p:blipFill>
-        <p:spPr>
-          <a:xfrm>
-            <a:off x="8178194" y="1651005"/>
-            <a:ext cx="3231200" cy="3231200"/>
-          </a:xfrm>
-          <a:prstGeom prst="rect">
-            <a:avLst/>
-          </a:prstGeom>
-        </p:spPr>
-      </p:pic>
       <p:sp>
         <p:nvSpPr>
           <p:cNvPr id="2" name="Title 1"/>
@@ -8660,7 +9741,7 @@
         <p:spPr>
           <a:xfrm>
             <a:off x="649224" y="645106"/>
-            <a:ext cx="3650279" cy="1259894"/>
+            <a:ext cx="6574536" cy="774620"/>
           </a:xfrm>
         </p:spPr>
         <p:txBody>
@@ -8670,7 +9751,7 @@
           <a:lstStyle/>
           <a:p>
             <a:r>
-              <a:rPr lang="en-US" sz="3300"/>
+              <a:rPr lang="en-US" dirty="0"/>
               <a:t>Finding Optimal Rotations</a:t>
             </a:r>
           </a:p>
@@ -8678,33 +9759,188 @@
       </p:sp>
       <p:sp>
         <p:nvSpPr>
-          <p:cNvPr id="3" name="Content Placeholder 2"/>
-          <p:cNvSpPr>
-            <a:spLocks noGrp="1"/>
-          </p:cNvSpPr>
-          <p:nvPr>
-            <p:ph idx="1"/>
-          </p:nvPr>
-        </p:nvSpPr>
-        <p:spPr>
-          <a:xfrm>
-            <a:off x="649225" y="2133600"/>
-            <a:ext cx="3650278" cy="3759253"/>
-          </a:xfrm>
-        </p:spPr>
-        <p:txBody>
-          <a:bodyPr>
-            <a:normAutofit/>
+          <p:cNvPr id="17" name="Rectangle 16"/>
+          <p:cNvSpPr/>
+          <p:nvPr/>
+        </p:nvSpPr>
+        <p:spPr>
+          <a:xfrm>
+            <a:off x="1433203" y="5040182"/>
+            <a:ext cx="7949612" cy="923330"/>
+          </a:xfrm>
+          <a:prstGeom prst="rect">
+            <a:avLst/>
+          </a:prstGeom>
+        </p:spPr>
+        <p:txBody>
+          <a:bodyPr wrap="none">
+            <a:spAutoFit/>
           </a:bodyPr>
           <a:lstStyle/>
           <a:p>
+            <a:pPr marL="285750" indent="-285750">
+              <a:buFont typeface="Arial" panose="020B0604020202020204" pitchFamily="34" charset="0"/>
+              <a:buChar char="•"/>
+            </a:pPr>
+            <a:r>
+              <a:rPr lang="en-US" dirty="0" err="1"/>
+              <a:t>Kabsch</a:t>
+            </a:r>
             <a:r>
               <a:rPr lang="en-US" dirty="0"/>
-              <a:t>Anand</a:t>
-            </a:r>
-          </a:p>
-        </p:txBody>
-      </p:sp>
+              <a:t> algorithm is used to find optimal rotations between spheres</a:t>
+            </a:r>
+          </a:p>
+          <a:p>
+            <a:pPr marL="285750" indent="-285750">
+              <a:buFont typeface="Arial" panose="020B0604020202020204" pitchFamily="34" charset="0"/>
+              <a:buChar char="•"/>
+            </a:pPr>
+            <a:endParaRPr lang="en-US" dirty="0"/>
+          </a:p>
+          <a:p>
+            <a:pPr marL="285750" indent="-285750">
+              <a:buFont typeface="Arial" panose="020B0604020202020204" pitchFamily="34" charset="0"/>
+              <a:buChar char="•"/>
+            </a:pPr>
+            <a:r>
+              <a:rPr lang="en-US" dirty="0"/>
+              <a:t>Finding Optimal Rotation has a closed form solution based on SVD</a:t>
+            </a:r>
+          </a:p>
+        </p:txBody>
+      </p:sp>
+      <p:grpSp>
+        <p:nvGrpSpPr>
+          <p:cNvPr id="19" name="Group 18"/>
+          <p:cNvGrpSpPr/>
+          <p:nvPr/>
+        </p:nvGrpSpPr>
+        <p:grpSpPr>
+          <a:xfrm>
+            <a:off x="2282531" y="2065618"/>
+            <a:ext cx="6551689" cy="1975064"/>
+            <a:chOff x="2109536" y="2545190"/>
+            <a:chExt cx="6551689" cy="1975064"/>
+          </a:xfrm>
+        </p:grpSpPr>
+        <p:pic>
+          <p:nvPicPr>
+            <p:cNvPr id="11" name="Picture 10"/>
+            <p:cNvPicPr>
+              <a:picLocks noChangeAspect="1"/>
+            </p:cNvPicPr>
+            <p:nvPr/>
+          </p:nvPicPr>
+          <p:blipFill rotWithShape="1">
+            <a:blip r:embed="rId2">
+              <a:extLst>
+                <a:ext uri="{28A0092B-C50C-407E-A947-70E740481C1C}">
+                  <a14:useLocalDpi xmlns:a14="http://schemas.microsoft.com/office/drawing/2010/main" val="0"/>
+                </a:ext>
+              </a:extLst>
+            </a:blip>
+            <a:srcRect l="35062" t="27633" r="35323" b="18085"/>
+            <a:stretch/>
+          </p:blipFill>
+          <p:spPr>
+            <a:xfrm>
+              <a:off x="2109536" y="2635381"/>
+              <a:ext cx="1904305" cy="1884873"/>
+            </a:xfrm>
+            <a:prstGeom prst="rect">
+              <a:avLst/>
+            </a:prstGeom>
+          </p:spPr>
+        </p:pic>
+        <p:pic>
+          <p:nvPicPr>
+            <p:cNvPr id="6" name="Picture 5"/>
+            <p:cNvPicPr>
+              <a:picLocks noChangeAspect="1"/>
+            </p:cNvPicPr>
+            <p:nvPr/>
+          </p:nvPicPr>
+          <p:blipFill rotWithShape="1">
+            <a:blip r:embed="rId3">
+              <a:extLst>
+                <a:ext uri="{28A0092B-C50C-407E-A947-70E740481C1C}">
+                  <a14:useLocalDpi xmlns:a14="http://schemas.microsoft.com/office/drawing/2010/main" val="0"/>
+                </a:ext>
+              </a:extLst>
+            </a:blip>
+            <a:srcRect l="35199" t="28085" r="34884" b="18192"/>
+            <a:stretch/>
+          </p:blipFill>
+          <p:spPr>
+            <a:xfrm>
+              <a:off x="4028518" y="2634087"/>
+              <a:ext cx="1945112" cy="1886167"/>
+            </a:xfrm>
+            <a:prstGeom prst="rect">
+              <a:avLst/>
+            </a:prstGeom>
+          </p:spPr>
+        </p:pic>
+        <p:pic>
+          <p:nvPicPr>
+            <p:cNvPr id="16" name="Picture 15"/>
+            <p:cNvPicPr>
+              <a:picLocks noChangeAspect="1"/>
+            </p:cNvPicPr>
+            <p:nvPr/>
+          </p:nvPicPr>
+          <p:blipFill rotWithShape="1">
+            <a:blip r:embed="rId2">
+              <a:extLst>
+                <a:ext uri="{28A0092B-C50C-407E-A947-70E740481C1C}">
+                  <a14:useLocalDpi xmlns:a14="http://schemas.microsoft.com/office/drawing/2010/main" val="0"/>
+                </a:ext>
+              </a:extLst>
+            </a:blip>
+            <a:srcRect l="35608" t="27689" r="35561" b="19266"/>
+            <a:stretch/>
+          </p:blipFill>
+          <p:spPr>
+            <a:xfrm>
+              <a:off x="6674282" y="2545190"/>
+              <a:ext cx="1986943" cy="1975064"/>
+            </a:xfrm>
+            <a:prstGeom prst="rect">
+              <a:avLst/>
+            </a:prstGeom>
+          </p:spPr>
+        </p:pic>
+        <p:sp>
+          <p:nvSpPr>
+            <p:cNvPr id="18" name="TextBox 17"/>
+            <p:cNvSpPr txBox="1"/>
+            <p:nvPr/>
+          </p:nvSpPr>
+          <p:spPr>
+            <a:xfrm>
+              <a:off x="6116207" y="3241567"/>
+              <a:ext cx="415498" cy="369332"/>
+            </a:xfrm>
+            <a:prstGeom prst="rect">
+              <a:avLst/>
+            </a:prstGeom>
+            <a:noFill/>
+          </p:spPr>
+          <p:txBody>
+            <a:bodyPr wrap="none" rtlCol="0">
+              <a:spAutoFit/>
+            </a:bodyPr>
+            <a:lstStyle/>
+            <a:p>
+              <a:r>
+                <a:rPr lang="en-US" dirty="0"/>
+                <a:t>…</a:t>
+              </a:r>
+            </a:p>
+          </p:txBody>
+        </p:sp>
+      </p:grpSp>
     </p:spTree>
     <p:extLst>
       <p:ext uri="{BB962C8B-B14F-4D97-AF65-F5344CB8AC3E}">
@@ -8745,9 +9981,16 @@
             <p:ph type="title"/>
           </p:nvPr>
         </p:nvSpPr>
-        <p:spPr/>
-        <p:txBody>
-          <a:bodyPr/>
+        <p:spPr>
+          <a:xfrm>
+            <a:off x="2592925" y="288004"/>
+            <a:ext cx="8911687" cy="603328"/>
+          </a:xfrm>
+        </p:spPr>
+        <p:txBody>
+          <a:bodyPr>
+            <a:normAutofit fontScale="90000"/>
+          </a:bodyPr>
           <a:lstStyle/>
           <a:p>
             <a:r>
@@ -8757,29 +10000,302 @@
           </a:p>
         </p:txBody>
       </p:sp>
-      <p:sp>
-        <p:nvSpPr>
-          <p:cNvPr id="3" name="Content Placeholder 2"/>
-          <p:cNvSpPr>
-            <a:spLocks noGrp="1"/>
-          </p:cNvSpPr>
+      <p:pic>
+        <p:nvPicPr>
+          <p:cNvPr id="8" name="Content Placeholder 7"/>
+          <p:cNvPicPr>
+            <a:picLocks noGrp="1" noChangeAspect="1"/>
+          </p:cNvPicPr>
           <p:nvPr>
             <p:ph idx="1"/>
           </p:nvPr>
-        </p:nvSpPr>
-        <p:spPr/>
-        <p:txBody>
-          <a:bodyPr/>
+        </p:nvPicPr>
+        <p:blipFill rotWithShape="1">
+          <a:blip r:embed="rId2">
+            <a:extLst>
+              <a:ext uri="{28A0092B-C50C-407E-A947-70E740481C1C}">
+                <a14:useLocalDpi xmlns:a14="http://schemas.microsoft.com/office/drawing/2010/main" val="0"/>
+              </a:ext>
+            </a:extLst>
+          </a:blip>
+          <a:srcRect l="9396" t="92029" r="10235" b="1210"/>
+          <a:stretch/>
+        </p:blipFill>
+        <p:spPr>
+          <a:xfrm rot="16200000">
+            <a:off x="7654141" y="3722313"/>
+            <a:ext cx="3062094" cy="197708"/>
+          </a:xfrm>
+        </p:spPr>
+      </p:pic>
+      <p:pic>
+        <p:nvPicPr>
+          <p:cNvPr id="4" name="Picture 3"/>
+          <p:cNvPicPr>
+            <a:picLocks noChangeAspect="1"/>
+          </p:cNvPicPr>
+          <p:nvPr/>
+        </p:nvPicPr>
+        <p:blipFill rotWithShape="1">
+          <a:blip r:embed="rId3">
+            <a:extLst>
+              <a:ext uri="{28A0092B-C50C-407E-A947-70E740481C1C}">
+                <a14:useLocalDpi xmlns:a14="http://schemas.microsoft.com/office/drawing/2010/main" val="0"/>
+              </a:ext>
+            </a:extLst>
+          </a:blip>
+          <a:srcRect l="19473" t="21164" r="19580" b="20410"/>
+          <a:stretch/>
+        </p:blipFill>
+        <p:spPr>
+          <a:xfrm>
+            <a:off x="2652629" y="1727804"/>
+            <a:ext cx="3053546" cy="2246651"/>
+          </a:xfrm>
+          <a:prstGeom prst="rect">
+            <a:avLst/>
+          </a:prstGeom>
+        </p:spPr>
+      </p:pic>
+      <p:pic>
+        <p:nvPicPr>
+          <p:cNvPr id="5" name="Picture 4"/>
+          <p:cNvPicPr>
+            <a:picLocks noChangeAspect="1"/>
+          </p:cNvPicPr>
+          <p:nvPr/>
+        </p:nvPicPr>
+        <p:blipFill rotWithShape="1">
+          <a:blip r:embed="rId4">
+            <a:extLst>
+              <a:ext uri="{28A0092B-C50C-407E-A947-70E740481C1C}">
+                <a14:useLocalDpi xmlns:a14="http://schemas.microsoft.com/office/drawing/2010/main" val="0"/>
+              </a:ext>
+            </a:extLst>
+          </a:blip>
+          <a:srcRect l="19474" t="21146" r="19579" b="20428"/>
+          <a:stretch/>
+        </p:blipFill>
+        <p:spPr>
+          <a:xfrm>
+            <a:off x="5700629" y="1728966"/>
+            <a:ext cx="3053547" cy="2246654"/>
+          </a:xfrm>
+          <a:prstGeom prst="rect">
+            <a:avLst/>
+          </a:prstGeom>
+        </p:spPr>
+      </p:pic>
+      <p:pic>
+        <p:nvPicPr>
+          <p:cNvPr id="6" name="Picture 5"/>
+          <p:cNvPicPr>
+            <a:picLocks noChangeAspect="1"/>
+          </p:cNvPicPr>
+          <p:nvPr/>
+        </p:nvPicPr>
+        <p:blipFill rotWithShape="1">
+          <a:blip r:embed="rId5">
+            <a:extLst>
+              <a:ext uri="{28A0092B-C50C-407E-A947-70E740481C1C}">
+                <a14:useLocalDpi xmlns:a14="http://schemas.microsoft.com/office/drawing/2010/main" val="0"/>
+              </a:ext>
+            </a:extLst>
+          </a:blip>
+          <a:srcRect l="19263" t="21146" r="19579" b="20428"/>
+          <a:stretch/>
+        </p:blipFill>
+        <p:spPr>
+          <a:xfrm>
+            <a:off x="5690078" y="3951880"/>
+            <a:ext cx="3064094" cy="2246654"/>
+          </a:xfrm>
+          <a:prstGeom prst="rect">
+            <a:avLst/>
+          </a:prstGeom>
+        </p:spPr>
+      </p:pic>
+      <p:pic>
+        <p:nvPicPr>
+          <p:cNvPr id="7" name="Picture 6"/>
+          <p:cNvPicPr>
+            <a:picLocks noChangeAspect="1"/>
+          </p:cNvPicPr>
+          <p:nvPr/>
+        </p:nvPicPr>
+        <p:blipFill rotWithShape="1">
+          <a:blip r:embed="rId6">
+            <a:extLst>
+              <a:ext uri="{28A0092B-C50C-407E-A947-70E740481C1C}">
+                <a14:useLocalDpi xmlns:a14="http://schemas.microsoft.com/office/drawing/2010/main" val="0"/>
+              </a:ext>
+            </a:extLst>
+          </a:blip>
+          <a:srcRect l="19263" t="20677" r="19579" b="20897"/>
+          <a:stretch/>
+        </p:blipFill>
+        <p:spPr>
+          <a:xfrm>
+            <a:off x="2660867" y="3946111"/>
+            <a:ext cx="3064094" cy="2246651"/>
+          </a:xfrm>
+          <a:prstGeom prst="rect">
+            <a:avLst/>
+          </a:prstGeom>
+        </p:spPr>
+      </p:pic>
+      <p:sp>
+        <p:nvSpPr>
+          <p:cNvPr id="9" name="TextBox 8"/>
+          <p:cNvSpPr txBox="1"/>
+          <p:nvPr/>
+        </p:nvSpPr>
+        <p:spPr>
+          <a:xfrm>
+            <a:off x="3161100" y="1258193"/>
+            <a:ext cx="1890261" cy="430887"/>
+          </a:xfrm>
+          <a:prstGeom prst="rect">
+            <a:avLst/>
+          </a:prstGeom>
+          <a:noFill/>
+        </p:spPr>
+        <p:txBody>
+          <a:bodyPr wrap="none" rtlCol="0">
+            <a:spAutoFit/>
+          </a:bodyPr>
           <a:lstStyle/>
           <a:p>
-            <a:endParaRPr lang="en-US" dirty="0"/>
+            <a:pPr algn="ctr"/>
+            <a:r>
+              <a:rPr lang="en-US" sz="1100" dirty="0"/>
+              <a:t>Average Correlation in </a:t>
+            </a:r>
+          </a:p>
+          <a:p>
+            <a:pPr algn="ctr"/>
+            <a:r>
+              <a:rPr lang="en-US" sz="1100" dirty="0" err="1"/>
+              <a:t>rfMRIs</a:t>
+            </a:r>
+            <a:r>
+              <a:rPr lang="en-US" sz="1100" dirty="0"/>
+              <a:t> of original Subjects</a:t>
+            </a:r>
+          </a:p>
+        </p:txBody>
+      </p:sp>
+      <p:sp>
+        <p:nvSpPr>
+          <p:cNvPr id="10" name="TextBox 9"/>
+          <p:cNvSpPr txBox="1"/>
+          <p:nvPr/>
+        </p:nvSpPr>
+        <p:spPr>
+          <a:xfrm>
+            <a:off x="6245131" y="1297498"/>
+            <a:ext cx="2238113" cy="430887"/>
+          </a:xfrm>
+          <a:prstGeom prst="rect">
+            <a:avLst/>
+          </a:prstGeom>
+          <a:noFill/>
+        </p:spPr>
+        <p:txBody>
+          <a:bodyPr wrap="none" rtlCol="0">
+            <a:spAutoFit/>
+          </a:bodyPr>
+          <a:lstStyle/>
+          <a:p>
+            <a:pPr algn="ctr"/>
+            <a:r>
+              <a:rPr lang="en-US" sz="1100" dirty="0"/>
+              <a:t>Average Correlation in</a:t>
+            </a:r>
+          </a:p>
+          <a:p>
+            <a:pPr algn="ctr"/>
+            <a:r>
+              <a:rPr lang="en-US" sz="1100" dirty="0" err="1"/>
+              <a:t>rfMRIs</a:t>
+            </a:r>
+            <a:r>
+              <a:rPr lang="en-US" sz="1100" dirty="0"/>
+              <a:t> of </a:t>
+            </a:r>
+            <a:r>
+              <a:rPr lang="en-US" sz="1100" dirty="0" err="1"/>
+              <a:t>BrainSynced</a:t>
+            </a:r>
+            <a:r>
+              <a:rPr lang="en-US" sz="1100" dirty="0"/>
+              <a:t> Subjects</a:t>
+            </a:r>
+          </a:p>
+        </p:txBody>
+      </p:sp>
+      <p:sp>
+        <p:nvSpPr>
+          <p:cNvPr id="11" name="TextBox 10"/>
+          <p:cNvSpPr txBox="1"/>
+          <p:nvPr/>
+        </p:nvSpPr>
+        <p:spPr>
+          <a:xfrm>
+            <a:off x="9284042" y="5075208"/>
+            <a:ext cx="312906" cy="369332"/>
+          </a:xfrm>
+          <a:prstGeom prst="rect">
+            <a:avLst/>
+          </a:prstGeom>
+          <a:noFill/>
+        </p:spPr>
+        <p:txBody>
+          <a:bodyPr wrap="none" rtlCol="0">
+            <a:spAutoFit/>
+          </a:bodyPr>
+          <a:lstStyle/>
+          <a:p>
+            <a:r>
+              <a:rPr lang="en-US" dirty="0"/>
+              <a:t>0</a:t>
+            </a:r>
+          </a:p>
+        </p:txBody>
+      </p:sp>
+      <p:sp>
+        <p:nvSpPr>
+          <p:cNvPr id="12" name="TextBox 11"/>
+          <p:cNvSpPr txBox="1"/>
+          <p:nvPr/>
+        </p:nvSpPr>
+        <p:spPr>
+          <a:xfrm>
+            <a:off x="9298392" y="2204322"/>
+            <a:ext cx="284206" cy="369332"/>
+          </a:xfrm>
+          <a:prstGeom prst="rect">
+            <a:avLst/>
+          </a:prstGeom>
+          <a:noFill/>
+        </p:spPr>
+        <p:txBody>
+          <a:bodyPr wrap="square" rtlCol="0">
+            <a:spAutoFit/>
+          </a:bodyPr>
+          <a:lstStyle/>
+          <a:p>
+            <a:r>
+              <a:rPr lang="en-US" dirty="0"/>
+              <a:t>1</a:t>
+            </a:r>
           </a:p>
         </p:txBody>
       </p:sp>
     </p:spTree>
     <p:extLst>
       <p:ext uri="{BB962C8B-B14F-4D97-AF65-F5344CB8AC3E}">
-        <p14:creationId xmlns:p14="http://schemas.microsoft.com/office/powerpoint/2010/main" val="2668661448"/>
+        <p14:creationId xmlns:p14="http://schemas.microsoft.com/office/powerpoint/2010/main" val="4000442411"/>
       </p:ext>
     </p:extLst>
   </p:cSld>
@@ -8818,26 +10334,24 @@
         </p:nvSpPr>
         <p:spPr>
           <a:xfrm>
-            <a:off x="2592925" y="0"/>
-            <a:ext cx="8911687" cy="547467"/>
-          </a:xfrm>
-        </p:spPr>
-        <p:txBody>
-          <a:bodyPr>
-            <a:normAutofit fontScale="90000"/>
-          </a:bodyPr>
+            <a:off x="2378741" y="245169"/>
+            <a:ext cx="8911687" cy="710420"/>
+          </a:xfrm>
+        </p:spPr>
+        <p:txBody>
+          <a:bodyPr/>
           <a:lstStyle/>
           <a:p>
             <a:r>
               <a:rPr lang="en-US" dirty="0"/>
-              <a:t>Parcellation Individually</a:t>
+              <a:t>Correlation of Signals</a:t>
             </a:r>
           </a:p>
         </p:txBody>
       </p:sp>
       <p:pic>
         <p:nvPicPr>
-          <p:cNvPr id="4" name="Content Placeholder 3"/>
+          <p:cNvPr id="11" name="Content Placeholder 10"/>
           <p:cNvPicPr>
             <a:picLocks noGrp="1" noChangeAspect="1"/>
           </p:cNvPicPr>
@@ -8845,7 +10359,7 @@
             <p:ph idx="1"/>
           </p:nvPr>
         </p:nvPicPr>
-        <p:blipFill>
+        <p:blipFill rotWithShape="1">
           <a:blip r:embed="rId2">
             <a:extLst>
               <a:ext uri="{28A0092B-C50C-407E-A947-70E740481C1C}">
@@ -8853,165 +10367,14 @@
               </a:ext>
             </a:extLst>
           </a:blip>
-          <a:stretch>
-            <a:fillRect/>
-          </a:stretch>
+          <a:srcRect l="19520" t="19456" r="19635" b="19411"/>
+          <a:stretch/>
         </p:blipFill>
         <p:spPr>
           <a:xfrm>
-            <a:off x="1509712" y="1185865"/>
-            <a:ext cx="2571750" cy="1866900"/>
-          </a:xfrm>
-        </p:spPr>
-      </p:pic>
-      <p:pic>
-        <p:nvPicPr>
-          <p:cNvPr id="5" name="Picture 4"/>
-          <p:cNvPicPr>
-            <a:picLocks noChangeAspect="1"/>
-          </p:cNvPicPr>
-          <p:nvPr/>
-        </p:nvPicPr>
-        <p:blipFill>
-          <a:blip r:embed="rId3">
-            <a:extLst>
-              <a:ext uri="{28A0092B-C50C-407E-A947-70E740481C1C}">
-                <a14:useLocalDpi xmlns:a14="http://schemas.microsoft.com/office/drawing/2010/main" val="0"/>
-              </a:ext>
-            </a:extLst>
-          </a:blip>
-          <a:stretch>
-            <a:fillRect/>
-          </a:stretch>
-        </p:blipFill>
-        <p:spPr>
-          <a:xfrm>
-            <a:off x="4081462" y="1185865"/>
-            <a:ext cx="2571750" cy="1866900"/>
-          </a:xfrm>
-          <a:prstGeom prst="rect">
-            <a:avLst/>
-          </a:prstGeom>
-        </p:spPr>
-      </p:pic>
-      <p:pic>
-        <p:nvPicPr>
-          <p:cNvPr id="6" name="Picture 5"/>
-          <p:cNvPicPr>
-            <a:picLocks noChangeAspect="1"/>
-          </p:cNvPicPr>
-          <p:nvPr/>
-        </p:nvPicPr>
-        <p:blipFill>
-          <a:blip r:embed="rId4">
-            <a:extLst>
-              <a:ext uri="{28A0092B-C50C-407E-A947-70E740481C1C}">
-                <a14:useLocalDpi xmlns:a14="http://schemas.microsoft.com/office/drawing/2010/main" val="0"/>
-              </a:ext>
-            </a:extLst>
-          </a:blip>
-          <a:stretch>
-            <a:fillRect/>
-          </a:stretch>
-        </p:blipFill>
-        <p:spPr>
-          <a:xfrm>
-            <a:off x="1509712" y="3052765"/>
-            <a:ext cx="2571750" cy="1866900"/>
-          </a:xfrm>
-          <a:prstGeom prst="rect">
-            <a:avLst/>
-          </a:prstGeom>
-        </p:spPr>
-      </p:pic>
-      <p:pic>
-        <p:nvPicPr>
-          <p:cNvPr id="7" name="Picture 6"/>
-          <p:cNvPicPr>
-            <a:picLocks noChangeAspect="1"/>
-          </p:cNvPicPr>
-          <p:nvPr/>
-        </p:nvPicPr>
-        <p:blipFill>
-          <a:blip r:embed="rId5">
-            <a:extLst>
-              <a:ext uri="{28A0092B-C50C-407E-A947-70E740481C1C}">
-                <a14:useLocalDpi xmlns:a14="http://schemas.microsoft.com/office/drawing/2010/main" val="0"/>
-              </a:ext>
-            </a:extLst>
-          </a:blip>
-          <a:stretch>
-            <a:fillRect/>
-          </a:stretch>
-        </p:blipFill>
-        <p:spPr>
-          <a:xfrm>
-            <a:off x="4092580" y="3052765"/>
-            <a:ext cx="2571750" cy="1866900"/>
-          </a:xfrm>
-          <a:prstGeom prst="rect">
-            <a:avLst/>
-          </a:prstGeom>
-        </p:spPr>
-      </p:pic>
-      <p:pic>
-        <p:nvPicPr>
-          <p:cNvPr id="10" name="Picture 9"/>
-          <p:cNvPicPr>
-            <a:picLocks noChangeAspect="1"/>
-          </p:cNvPicPr>
-          <p:nvPr/>
-        </p:nvPicPr>
-        <p:blipFill>
-          <a:blip r:embed="rId6">
-            <a:extLst>
-              <a:ext uri="{28A0092B-C50C-407E-A947-70E740481C1C}">
-                <a14:useLocalDpi xmlns:a14="http://schemas.microsoft.com/office/drawing/2010/main" val="0"/>
-              </a:ext>
-            </a:extLst>
-          </a:blip>
-          <a:stretch>
-            <a:fillRect/>
-          </a:stretch>
-        </p:blipFill>
-        <p:spPr>
-          <a:xfrm>
-            <a:off x="9620250" y="3052765"/>
-            <a:ext cx="2571750" cy="1866900"/>
-          </a:xfrm>
-          <a:prstGeom prst="rect">
-            <a:avLst/>
-          </a:prstGeom>
-        </p:spPr>
-      </p:pic>
-      <p:pic>
-        <p:nvPicPr>
-          <p:cNvPr id="11" name="Picture 10"/>
-          <p:cNvPicPr>
-            <a:picLocks noChangeAspect="1"/>
-          </p:cNvPicPr>
-          <p:nvPr/>
-        </p:nvPicPr>
-        <p:blipFill>
-          <a:blip r:embed="rId7">
-            <a:extLst>
-              <a:ext uri="{28A0092B-C50C-407E-A947-70E740481C1C}">
-                <a14:useLocalDpi xmlns:a14="http://schemas.microsoft.com/office/drawing/2010/main" val="0"/>
-              </a:ext>
-            </a:extLst>
-          </a:blip>
-          <a:stretch>
-            <a:fillRect/>
-          </a:stretch>
-        </p:blipFill>
-        <p:spPr>
-          <a:xfrm>
-            <a:off x="7037382" y="3052765"/>
-            <a:ext cx="2571750" cy="1866900"/>
-          </a:xfrm>
-          <a:prstGeom prst="rect">
-            <a:avLst/>
-          </a:prstGeom>
+            <a:off x="7479360" y="4192944"/>
+            <a:ext cx="2318197" cy="1787625"/>
+          </a:xfrm>
         </p:spPr>
       </p:pic>
       <p:pic>
@@ -9022,22 +10385,21 @@
           </p:cNvPicPr>
           <p:nvPr/>
         </p:nvPicPr>
-        <p:blipFill>
-          <a:blip r:embed="rId8">
+        <p:blipFill rotWithShape="1">
+          <a:blip r:embed="rId3">
             <a:extLst>
               <a:ext uri="{28A0092B-C50C-407E-A947-70E740481C1C}">
                 <a14:useLocalDpi xmlns:a14="http://schemas.microsoft.com/office/drawing/2010/main" val="0"/>
               </a:ext>
             </a:extLst>
           </a:blip>
-          <a:stretch>
-            <a:fillRect/>
-          </a:stretch>
+          <a:srcRect l="19465" t="20790" r="19690" b="21043"/>
+          <a:stretch/>
         </p:blipFill>
         <p:spPr>
           <a:xfrm>
-            <a:off x="9620250" y="1185865"/>
-            <a:ext cx="2571750" cy="1866900"/>
+            <a:off x="5173595" y="2564254"/>
+            <a:ext cx="2318198" cy="1700917"/>
           </a:xfrm>
           <a:prstGeom prst="rect">
             <a:avLst/>
@@ -9052,32 +10414,337 @@
           </p:cNvPicPr>
           <p:nvPr/>
         </p:nvPicPr>
-        <p:blipFill>
-          <a:blip r:embed="rId9">
+        <p:blipFill rotWithShape="1">
+          <a:blip r:embed="rId4">
             <a:extLst>
               <a:ext uri="{28A0092B-C50C-407E-A947-70E740481C1C}">
                 <a14:useLocalDpi xmlns:a14="http://schemas.microsoft.com/office/drawing/2010/main" val="0"/>
               </a:ext>
             </a:extLst>
           </a:blip>
-          <a:stretch>
-            <a:fillRect/>
-          </a:stretch>
+          <a:srcRect l="19803" t="20303" r="19352" b="21042"/>
+          <a:stretch/>
         </p:blipFill>
         <p:spPr>
           <a:xfrm>
-            <a:off x="7050082" y="1185865"/>
-            <a:ext cx="2571750" cy="1866900"/>
+            <a:off x="5173595" y="4265420"/>
+            <a:ext cx="2318198" cy="1715149"/>
           </a:xfrm>
           <a:prstGeom prst="rect">
             <a:avLst/>
           </a:prstGeom>
         </p:spPr>
       </p:pic>
+      <p:pic>
+        <p:nvPicPr>
+          <p:cNvPr id="14" name="Picture 13"/>
+          <p:cNvPicPr>
+            <a:picLocks noChangeAspect="1"/>
+          </p:cNvPicPr>
+          <p:nvPr/>
+        </p:nvPicPr>
+        <p:blipFill rotWithShape="1">
+          <a:blip r:embed="rId5">
+            <a:extLst>
+              <a:ext uri="{28A0092B-C50C-407E-A947-70E740481C1C}">
+                <a14:useLocalDpi xmlns:a14="http://schemas.microsoft.com/office/drawing/2010/main" val="0"/>
+              </a:ext>
+            </a:extLst>
+          </a:blip>
+          <a:srcRect l="19126" t="20791" r="19690" b="21482"/>
+          <a:stretch/>
+        </p:blipFill>
+        <p:spPr>
+          <a:xfrm>
+            <a:off x="7472921" y="2562580"/>
+            <a:ext cx="2331077" cy="1688039"/>
+          </a:xfrm>
+          <a:prstGeom prst="rect">
+            <a:avLst/>
+          </a:prstGeom>
+        </p:spPr>
+      </p:pic>
+      <p:pic>
+        <p:nvPicPr>
+          <p:cNvPr id="15" name="Picture 14"/>
+          <p:cNvPicPr>
+            <a:picLocks noChangeAspect="1"/>
+          </p:cNvPicPr>
+          <p:nvPr/>
+        </p:nvPicPr>
+        <p:blipFill rotWithShape="1">
+          <a:blip r:embed="rId6">
+            <a:extLst>
+              <a:ext uri="{28A0092B-C50C-407E-A947-70E740481C1C}">
+                <a14:useLocalDpi xmlns:a14="http://schemas.microsoft.com/office/drawing/2010/main" val="0"/>
+              </a:ext>
+            </a:extLst>
+          </a:blip>
+          <a:srcRect l="19437" t="21787" r="19717" b="20304"/>
+          <a:stretch/>
+        </p:blipFill>
+        <p:spPr>
+          <a:xfrm>
+            <a:off x="2855398" y="4283296"/>
+            <a:ext cx="2318197" cy="1693347"/>
+          </a:xfrm>
+          <a:prstGeom prst="rect">
+            <a:avLst/>
+          </a:prstGeom>
+        </p:spPr>
+      </p:pic>
+      <p:pic>
+        <p:nvPicPr>
+          <p:cNvPr id="16" name="Picture 15"/>
+          <p:cNvPicPr>
+            <a:picLocks noChangeAspect="1"/>
+          </p:cNvPicPr>
+          <p:nvPr/>
+        </p:nvPicPr>
+        <p:blipFill rotWithShape="1">
+          <a:blip r:embed="rId7">
+            <a:extLst>
+              <a:ext uri="{28A0092B-C50C-407E-A947-70E740481C1C}">
+                <a14:useLocalDpi xmlns:a14="http://schemas.microsoft.com/office/drawing/2010/main" val="0"/>
+              </a:ext>
+            </a:extLst>
+          </a:blip>
+          <a:srcRect l="19465" t="20304" r="19352" b="20601"/>
+          <a:stretch/>
+        </p:blipFill>
+        <p:spPr>
+          <a:xfrm>
+            <a:off x="2861390" y="2565920"/>
+            <a:ext cx="2331077" cy="1728028"/>
+          </a:xfrm>
+          <a:prstGeom prst="rect">
+            <a:avLst/>
+          </a:prstGeom>
+        </p:spPr>
+      </p:pic>
+      <p:sp>
+        <p:nvSpPr>
+          <p:cNvPr id="7" name="TextBox 6"/>
+          <p:cNvSpPr txBox="1"/>
+          <p:nvPr/>
+        </p:nvSpPr>
+        <p:spPr>
+          <a:xfrm>
+            <a:off x="2627870" y="1062681"/>
+            <a:ext cx="7297190" cy="369332"/>
+          </a:xfrm>
+          <a:prstGeom prst="rect">
+            <a:avLst/>
+          </a:prstGeom>
+          <a:noFill/>
+        </p:spPr>
+        <p:txBody>
+          <a:bodyPr wrap="none" rtlCol="0">
+            <a:spAutoFit/>
+          </a:bodyPr>
+          <a:lstStyle/>
+          <a:p>
+            <a:r>
+              <a:rPr lang="en-US" dirty="0"/>
+              <a:t>Correlation of average signal in </a:t>
+            </a:r>
+            <a:r>
+              <a:rPr lang="en-US" dirty="0" err="1"/>
+              <a:t>precuneus</a:t>
+            </a:r>
+            <a:r>
+              <a:rPr lang="en-US" dirty="0"/>
+              <a:t> to the signals in brain</a:t>
+            </a:r>
+          </a:p>
+        </p:txBody>
+      </p:sp>
+      <p:sp>
+        <p:nvSpPr>
+          <p:cNvPr id="8" name="TextBox 7"/>
+          <p:cNvSpPr txBox="1"/>
+          <p:nvPr/>
+        </p:nvSpPr>
+        <p:spPr>
+          <a:xfrm>
+            <a:off x="3146929" y="2195755"/>
+            <a:ext cx="1754006" cy="369332"/>
+          </a:xfrm>
+          <a:prstGeom prst="rect">
+            <a:avLst/>
+          </a:prstGeom>
+          <a:noFill/>
+        </p:spPr>
+        <p:txBody>
+          <a:bodyPr wrap="none" rtlCol="0">
+            <a:spAutoFit/>
+          </a:bodyPr>
+          <a:lstStyle/>
+          <a:p>
+            <a:r>
+              <a:rPr lang="en-US" dirty="0"/>
+              <a:t>Sub 1 to Sub 1</a:t>
+            </a:r>
+          </a:p>
+        </p:txBody>
+      </p:sp>
+      <p:sp>
+        <p:nvSpPr>
+          <p:cNvPr id="17" name="TextBox 16"/>
+          <p:cNvSpPr txBox="1"/>
+          <p:nvPr/>
+        </p:nvSpPr>
+        <p:spPr>
+          <a:xfrm>
+            <a:off x="5109698" y="2192662"/>
+            <a:ext cx="2409634" cy="369332"/>
+          </a:xfrm>
+          <a:prstGeom prst="rect">
+            <a:avLst/>
+          </a:prstGeom>
+          <a:noFill/>
+        </p:spPr>
+        <p:txBody>
+          <a:bodyPr wrap="none" rtlCol="0">
+            <a:spAutoFit/>
+          </a:bodyPr>
+          <a:lstStyle/>
+          <a:p>
+            <a:r>
+              <a:rPr lang="en-US" dirty="0"/>
+              <a:t>Sub 1 to Sub 2 (</a:t>
+            </a:r>
+            <a:r>
+              <a:rPr lang="en-US" dirty="0" err="1"/>
+              <a:t>orig</a:t>
+            </a:r>
+            <a:r>
+              <a:rPr lang="en-US" dirty="0"/>
+              <a:t>)</a:t>
+            </a:r>
+          </a:p>
+        </p:txBody>
+      </p:sp>
+      <p:sp>
+        <p:nvSpPr>
+          <p:cNvPr id="18" name="TextBox 17"/>
+          <p:cNvSpPr txBox="1"/>
+          <p:nvPr/>
+        </p:nvSpPr>
+        <p:spPr>
+          <a:xfrm>
+            <a:off x="7553485" y="2192662"/>
+            <a:ext cx="2286203" cy="369332"/>
+          </a:xfrm>
+          <a:prstGeom prst="rect">
+            <a:avLst/>
+          </a:prstGeom>
+          <a:noFill/>
+        </p:spPr>
+        <p:txBody>
+          <a:bodyPr wrap="none" rtlCol="0">
+            <a:spAutoFit/>
+          </a:bodyPr>
+          <a:lstStyle/>
+          <a:p>
+            <a:r>
+              <a:rPr lang="en-US" dirty="0"/>
+              <a:t>Sub 1 to Sub 2 (rot)</a:t>
+            </a:r>
+          </a:p>
+        </p:txBody>
+      </p:sp>
+      <p:pic>
+        <p:nvPicPr>
+          <p:cNvPr id="19" name="Content Placeholder 7"/>
+          <p:cNvPicPr>
+            <a:picLocks noChangeAspect="1"/>
+          </p:cNvPicPr>
+          <p:nvPr/>
+        </p:nvPicPr>
+        <p:blipFill rotWithShape="1">
+          <a:blip r:embed="rId8">
+            <a:extLst>
+              <a:ext uri="{28A0092B-C50C-407E-A947-70E740481C1C}">
+                <a14:useLocalDpi xmlns:a14="http://schemas.microsoft.com/office/drawing/2010/main" val="0"/>
+              </a:ext>
+            </a:extLst>
+          </a:blip>
+          <a:srcRect l="9396" t="92029" r="10235" b="1210"/>
+          <a:stretch/>
+        </p:blipFill>
+        <p:spPr>
+          <a:xfrm rot="16200000">
+            <a:off x="8631586" y="4184442"/>
+            <a:ext cx="3062094" cy="197708"/>
+          </a:xfrm>
+          <a:prstGeom prst="rect">
+            <a:avLst/>
+          </a:prstGeom>
+        </p:spPr>
+      </p:pic>
+      <p:sp>
+        <p:nvSpPr>
+          <p:cNvPr id="20" name="TextBox 19"/>
+          <p:cNvSpPr txBox="1"/>
+          <p:nvPr/>
+        </p:nvSpPr>
+        <p:spPr>
+          <a:xfrm>
+            <a:off x="10261487" y="5537337"/>
+            <a:ext cx="312906" cy="369332"/>
+          </a:xfrm>
+          <a:prstGeom prst="rect">
+            <a:avLst/>
+          </a:prstGeom>
+          <a:noFill/>
+        </p:spPr>
+        <p:txBody>
+          <a:bodyPr wrap="none" rtlCol="0">
+            <a:spAutoFit/>
+          </a:bodyPr>
+          <a:lstStyle/>
+          <a:p>
+            <a:r>
+              <a:rPr lang="en-US" dirty="0"/>
+              <a:t>0</a:t>
+            </a:r>
+          </a:p>
+        </p:txBody>
+      </p:sp>
+      <p:sp>
+        <p:nvSpPr>
+          <p:cNvPr id="21" name="TextBox 20"/>
+          <p:cNvSpPr txBox="1"/>
+          <p:nvPr/>
+        </p:nvSpPr>
+        <p:spPr>
+          <a:xfrm>
+            <a:off x="10275837" y="2666451"/>
+            <a:ext cx="284206" cy="369332"/>
+          </a:xfrm>
+          <a:prstGeom prst="rect">
+            <a:avLst/>
+          </a:prstGeom>
+          <a:noFill/>
+        </p:spPr>
+        <p:txBody>
+          <a:bodyPr wrap="square" rtlCol="0">
+            <a:spAutoFit/>
+          </a:bodyPr>
+          <a:lstStyle/>
+          <a:p>
+            <a:r>
+              <a:rPr lang="en-US" dirty="0"/>
+              <a:t>1</a:t>
+            </a:r>
+          </a:p>
+        </p:txBody>
+      </p:sp>
     </p:spTree>
     <p:extLst>
       <p:ext uri="{BB962C8B-B14F-4D97-AF65-F5344CB8AC3E}">
-        <p14:creationId xmlns:p14="http://schemas.microsoft.com/office/powerpoint/2010/main" val="1591713396"/>
+        <p14:creationId xmlns:p14="http://schemas.microsoft.com/office/powerpoint/2010/main" val="2668661448"/>
       </p:ext>
     </p:extLst>
   </p:cSld>
@@ -9114,25 +10781,34 @@
             <p:ph type="title"/>
           </p:nvPr>
         </p:nvSpPr>
-        <p:spPr/>
-        <p:txBody>
-          <a:bodyPr/>
+        <p:spPr>
+          <a:xfrm>
+            <a:off x="2593570" y="115330"/>
+            <a:ext cx="8911687" cy="547467"/>
+          </a:xfrm>
+        </p:spPr>
+        <p:txBody>
+          <a:bodyPr>
+            <a:normAutofit fontScale="90000"/>
+          </a:bodyPr>
           <a:lstStyle/>
           <a:p>
             <a:r>
               <a:rPr lang="en-US" dirty="0"/>
-              <a:t>Clustered using 2 independent groups of 20 subjects</a:t>
+              <a:t>Parcellation Individually</a:t>
             </a:r>
           </a:p>
         </p:txBody>
       </p:sp>
       <p:pic>
         <p:nvPicPr>
-          <p:cNvPr id="12" name="Picture 11"/>
+          <p:cNvPr id="4" name="Content Placeholder 3"/>
           <p:cNvPicPr>
-            <a:picLocks noChangeAspect="1"/>
+            <a:picLocks noGrp="1" noChangeAspect="1"/>
           </p:cNvPicPr>
-          <p:nvPr/>
+          <p:nvPr>
+            <p:ph idx="1"/>
+          </p:nvPr>
         </p:nvPicPr>
         <p:blipFill>
           <a:blip r:embed="rId2">
@@ -9148,17 +10824,14 @@
         </p:blipFill>
         <p:spPr>
           <a:xfrm>
-            <a:off x="1307050" y="2281237"/>
+            <a:off x="1007204" y="1833773"/>
             <a:ext cx="2571750" cy="1866900"/>
           </a:xfrm>
-          <a:prstGeom prst="rect">
-            <a:avLst/>
-          </a:prstGeom>
         </p:spPr>
       </p:pic>
       <p:pic>
         <p:nvPicPr>
-          <p:cNvPr id="13" name="Picture 12"/>
+          <p:cNvPr id="5" name="Picture 4"/>
           <p:cNvPicPr>
             <a:picLocks noChangeAspect="1"/>
           </p:cNvPicPr>
@@ -9178,7 +10851,7 @@
         </p:blipFill>
         <p:spPr>
           <a:xfrm>
-            <a:off x="1307050" y="4148137"/>
+            <a:off x="1004954" y="3700673"/>
             <a:ext cx="2571750" cy="1866900"/>
           </a:xfrm>
           <a:prstGeom prst="rect">
@@ -9188,7 +10861,7 @@
       </p:pic>
       <p:pic>
         <p:nvPicPr>
-          <p:cNvPr id="14" name="Picture 13"/>
+          <p:cNvPr id="6" name="Picture 5"/>
           <p:cNvPicPr>
             <a:picLocks noChangeAspect="1"/>
           </p:cNvPicPr>
@@ -9208,7 +10881,7 @@
         </p:blipFill>
         <p:spPr>
           <a:xfrm>
-            <a:off x="3878800" y="4148137"/>
+            <a:off x="3577372" y="1833773"/>
             <a:ext cx="2571750" cy="1866900"/>
           </a:xfrm>
           <a:prstGeom prst="rect">
@@ -9218,7 +10891,7 @@
       </p:pic>
       <p:pic>
         <p:nvPicPr>
-          <p:cNvPr id="15" name="Picture 14"/>
+          <p:cNvPr id="7" name="Picture 6"/>
           <p:cNvPicPr>
             <a:picLocks noChangeAspect="1"/>
           </p:cNvPicPr>
@@ -9238,7 +10911,7 @@
         </p:blipFill>
         <p:spPr>
           <a:xfrm>
-            <a:off x="3878800" y="2281237"/>
+            <a:off x="3568905" y="3700673"/>
             <a:ext cx="2571750" cy="1866900"/>
           </a:xfrm>
           <a:prstGeom prst="rect">
@@ -9248,7 +10921,7 @@
       </p:pic>
       <p:pic>
         <p:nvPicPr>
-          <p:cNvPr id="16" name="Picture 15"/>
+          <p:cNvPr id="10" name="Picture 9"/>
           <p:cNvPicPr>
             <a:picLocks noChangeAspect="1"/>
           </p:cNvPicPr>
@@ -9268,7 +10941,7 @@
         </p:blipFill>
         <p:spPr>
           <a:xfrm>
-            <a:off x="6710362" y="2281237"/>
+            <a:off x="8712540" y="3700673"/>
             <a:ext cx="2571750" cy="1866900"/>
           </a:xfrm>
           <a:prstGeom prst="rect">
@@ -9278,7 +10951,7 @@
       </p:pic>
       <p:pic>
         <p:nvPicPr>
-          <p:cNvPr id="17" name="Picture 16"/>
+          <p:cNvPr id="11" name="Picture 10"/>
           <p:cNvPicPr>
             <a:picLocks noChangeAspect="1"/>
           </p:cNvPicPr>
@@ -9298,7 +10971,7 @@
         </p:blipFill>
         <p:spPr>
           <a:xfrm>
-            <a:off x="9282112" y="2281237"/>
+            <a:off x="8714790" y="1833773"/>
             <a:ext cx="2571750" cy="1866900"/>
           </a:xfrm>
           <a:prstGeom prst="rect">
@@ -9308,7 +10981,7 @@
       </p:pic>
       <p:pic>
         <p:nvPicPr>
-          <p:cNvPr id="18" name="Picture 17"/>
+          <p:cNvPr id="12" name="Picture 11"/>
           <p:cNvPicPr>
             <a:picLocks noChangeAspect="1"/>
           </p:cNvPicPr>
@@ -9328,7 +11001,7 @@
         </p:blipFill>
         <p:spPr>
           <a:xfrm>
-            <a:off x="9282112" y="4148137"/>
+            <a:off x="6138405" y="3700673"/>
             <a:ext cx="2571750" cy="1866900"/>
           </a:xfrm>
           <a:prstGeom prst="rect">
@@ -9338,14 +11011,14 @@
       </p:pic>
       <p:pic>
         <p:nvPicPr>
-          <p:cNvPr id="19" name="Picture 18"/>
+          <p:cNvPr id="13" name="Picture 12"/>
           <p:cNvPicPr>
             <a:picLocks noChangeAspect="1"/>
           </p:cNvPicPr>
           <p:nvPr/>
         </p:nvPicPr>
         <p:blipFill>
-          <a:blip r:embed="rId6">
+          <a:blip r:embed="rId9">
             <a:extLst>
               <a:ext uri="{28A0092B-C50C-407E-A947-70E740481C1C}">
                 <a14:useLocalDpi xmlns:a14="http://schemas.microsoft.com/office/drawing/2010/main" val="0"/>
@@ -9358,7 +11031,7 @@
         </p:blipFill>
         <p:spPr>
           <a:xfrm>
-            <a:off x="6710362" y="4148137"/>
+            <a:off x="6146872" y="1833773"/>
             <a:ext cx="2571750" cy="1866900"/>
           </a:xfrm>
           <a:prstGeom prst="rect">
@@ -9366,10 +11039,210 @@
           </a:prstGeom>
         </p:spPr>
       </p:pic>
+      <p:sp>
+        <p:nvSpPr>
+          <p:cNvPr id="3" name="TextBox 2"/>
+          <p:cNvSpPr txBox="1"/>
+          <p:nvPr/>
+        </p:nvSpPr>
+        <p:spPr>
+          <a:xfrm>
+            <a:off x="1820563" y="978081"/>
+            <a:ext cx="8101898" cy="369332"/>
+          </a:xfrm>
+          <a:prstGeom prst="rect">
+            <a:avLst/>
+          </a:prstGeom>
+          <a:noFill/>
+        </p:spPr>
+        <p:txBody>
+          <a:bodyPr wrap="none" rtlCol="0">
+            <a:spAutoFit/>
+          </a:bodyPr>
+          <a:lstStyle/>
+          <a:p>
+            <a:r>
+              <a:rPr lang="en-US" dirty="0"/>
+              <a:t>Subjects were independently </a:t>
+            </a:r>
+            <a:r>
+              <a:rPr lang="en-US" dirty="0" err="1"/>
+              <a:t>parcellated</a:t>
+            </a:r>
+            <a:r>
+              <a:rPr lang="en-US" dirty="0"/>
+              <a:t> by k-means with </a:t>
+            </a:r>
+            <a:r>
+              <a:rPr lang="en-US" dirty="0" err="1"/>
+              <a:t>nClusters</a:t>
+            </a:r>
+            <a:r>
+              <a:rPr lang="en-US" dirty="0"/>
+              <a:t>=30</a:t>
+            </a:r>
+          </a:p>
+        </p:txBody>
+      </p:sp>
+      <p:sp>
+        <p:nvSpPr>
+          <p:cNvPr id="8" name="TextBox 7"/>
+          <p:cNvSpPr txBox="1"/>
+          <p:nvPr/>
+        </p:nvSpPr>
+        <p:spPr>
+          <a:xfrm>
+            <a:off x="1896988" y="1481448"/>
+            <a:ext cx="790601" cy="369332"/>
+          </a:xfrm>
+          <a:prstGeom prst="rect">
+            <a:avLst/>
+          </a:prstGeom>
+          <a:noFill/>
+        </p:spPr>
+        <p:txBody>
+          <a:bodyPr wrap="none" rtlCol="0">
+            <a:spAutoFit/>
+          </a:bodyPr>
+          <a:lstStyle/>
+          <a:p>
+            <a:r>
+              <a:rPr lang="en-US" dirty="0"/>
+              <a:t>Sub 1</a:t>
+            </a:r>
+          </a:p>
+        </p:txBody>
+      </p:sp>
+      <p:sp>
+        <p:nvSpPr>
+          <p:cNvPr id="14" name="TextBox 13"/>
+          <p:cNvSpPr txBox="1"/>
+          <p:nvPr/>
+        </p:nvSpPr>
+        <p:spPr>
+          <a:xfrm>
+            <a:off x="4462656" y="1481448"/>
+            <a:ext cx="790601" cy="369332"/>
+          </a:xfrm>
+          <a:prstGeom prst="rect">
+            <a:avLst/>
+          </a:prstGeom>
+          <a:noFill/>
+        </p:spPr>
+        <p:txBody>
+          <a:bodyPr wrap="none" rtlCol="0">
+            <a:spAutoFit/>
+          </a:bodyPr>
+          <a:lstStyle/>
+          <a:p>
+            <a:r>
+              <a:rPr lang="en-US" dirty="0"/>
+              <a:t>Sub 2</a:t>
+            </a:r>
+          </a:p>
+        </p:txBody>
+      </p:sp>
+      <p:sp>
+        <p:nvSpPr>
+          <p:cNvPr id="15" name="TextBox 14"/>
+          <p:cNvSpPr txBox="1"/>
+          <p:nvPr/>
+        </p:nvSpPr>
+        <p:spPr>
+          <a:xfrm>
+            <a:off x="7042737" y="1464441"/>
+            <a:ext cx="790601" cy="369332"/>
+          </a:xfrm>
+          <a:prstGeom prst="rect">
+            <a:avLst/>
+          </a:prstGeom>
+          <a:noFill/>
+        </p:spPr>
+        <p:txBody>
+          <a:bodyPr wrap="none" rtlCol="0">
+            <a:spAutoFit/>
+          </a:bodyPr>
+          <a:lstStyle/>
+          <a:p>
+            <a:r>
+              <a:rPr lang="en-US" dirty="0"/>
+              <a:t>Sub 3</a:t>
+            </a:r>
+          </a:p>
+        </p:txBody>
+      </p:sp>
+      <p:sp>
+        <p:nvSpPr>
+          <p:cNvPr id="16" name="TextBox 15"/>
+          <p:cNvSpPr txBox="1"/>
+          <p:nvPr/>
+        </p:nvSpPr>
+        <p:spPr>
+          <a:xfrm>
+            <a:off x="9600074" y="1464441"/>
+            <a:ext cx="790601" cy="369332"/>
+          </a:xfrm>
+          <a:prstGeom prst="rect">
+            <a:avLst/>
+          </a:prstGeom>
+          <a:noFill/>
+        </p:spPr>
+        <p:txBody>
+          <a:bodyPr wrap="none" rtlCol="0">
+            <a:spAutoFit/>
+          </a:bodyPr>
+          <a:lstStyle/>
+          <a:p>
+            <a:r>
+              <a:rPr lang="en-US" dirty="0"/>
+              <a:t>Sub 4</a:t>
+            </a:r>
+          </a:p>
+        </p:txBody>
+      </p:sp>
+      <p:sp>
+        <p:nvSpPr>
+          <p:cNvPr id="9" name="TextBox 8"/>
+          <p:cNvSpPr txBox="1"/>
+          <p:nvPr/>
+        </p:nvSpPr>
+        <p:spPr>
+          <a:xfrm>
+            <a:off x="1334301" y="5873348"/>
+            <a:ext cx="9849171" cy="646331"/>
+          </a:xfrm>
+          <a:prstGeom prst="rect">
+            <a:avLst/>
+          </a:prstGeom>
+          <a:noFill/>
+        </p:spPr>
+        <p:txBody>
+          <a:bodyPr wrap="none" rtlCol="0">
+            <a:spAutoFit/>
+          </a:bodyPr>
+          <a:lstStyle/>
+          <a:p>
+            <a:r>
+              <a:rPr lang="en-US" b="1" i="1" dirty="0" err="1"/>
+              <a:t>Parcellations</a:t>
+            </a:r>
+            <a:r>
+              <a:rPr lang="en-US" b="1" i="1" dirty="0"/>
+              <a:t> are different for individual scans, probably because not enough samples </a:t>
+            </a:r>
+          </a:p>
+          <a:p>
+            <a:r>
+              <a:rPr lang="en-US" b="1" i="1" dirty="0"/>
+              <a:t>for finding correct boundaries</a:t>
+            </a:r>
+          </a:p>
+        </p:txBody>
+      </p:sp>
     </p:spTree>
     <p:extLst>
       <p:ext uri="{BB962C8B-B14F-4D97-AF65-F5344CB8AC3E}">
-        <p14:creationId xmlns:p14="http://schemas.microsoft.com/office/powerpoint/2010/main" val="3470648806"/>
+        <p14:creationId xmlns:p14="http://schemas.microsoft.com/office/powerpoint/2010/main" val="1591713396"/>
       </p:ext>
     </p:extLst>
   </p:cSld>
@@ -9413,7 +11286,7 @@
           <a:p>
             <a:r>
               <a:rPr lang="en-US" dirty="0"/>
-              <a:t>Session1 and Session 2 labeled separately</a:t>
+              <a:t>Group Parcellation</a:t>
             </a:r>
           </a:p>
         </p:txBody>
@@ -9428,19 +11301,44 @@
             <p:ph idx="1"/>
           </p:nvPr>
         </p:nvSpPr>
-        <p:spPr/>
+        <p:spPr>
+          <a:xfrm>
+            <a:off x="1683279" y="1905000"/>
+            <a:ext cx="8915400" cy="3777622"/>
+          </a:xfrm>
+        </p:spPr>
         <p:txBody>
           <a:bodyPr/>
           <a:lstStyle/>
           <a:p>
-            <a:endParaRPr lang="en-US"/>
+            <a:r>
+              <a:rPr lang="en-US" dirty="0"/>
+              <a:t>Since the data are comparable to each other after </a:t>
+            </a:r>
+            <a:r>
+              <a:rPr lang="en-US" dirty="0" err="1"/>
+              <a:t>BrainSync</a:t>
+            </a:r>
+            <a:r>
+              <a:rPr lang="en-US" dirty="0"/>
+              <a:t>, we can pool it and do joint parcellation</a:t>
+            </a:r>
+          </a:p>
+          <a:p>
+            <a:endParaRPr lang="en-US" dirty="0"/>
+          </a:p>
+          <a:p>
+            <a:r>
+              <a:rPr lang="en-US" b="1" i="1" dirty="0"/>
+              <a:t>Clustering will work better when data is pooled, rather than doing clustering one by one</a:t>
+            </a:r>
           </a:p>
         </p:txBody>
       </p:sp>
     </p:spTree>
     <p:extLst>
       <p:ext uri="{BB962C8B-B14F-4D97-AF65-F5344CB8AC3E}">
-        <p14:creationId xmlns:p14="http://schemas.microsoft.com/office/powerpoint/2010/main" val="729062655"/>
+        <p14:creationId xmlns:p14="http://schemas.microsoft.com/office/powerpoint/2010/main" val="1318014954"/>
       </p:ext>
     </p:extLst>
   </p:cSld>
@@ -9477,262 +11375,384 @@
             <p:ph type="title"/>
           </p:nvPr>
         </p:nvSpPr>
-        <p:spPr/>
+        <p:spPr>
+          <a:xfrm>
+            <a:off x="1656300" y="154553"/>
+            <a:ext cx="8911687" cy="1280890"/>
+          </a:xfrm>
+        </p:spPr>
         <p:txBody>
           <a:bodyPr/>
           <a:lstStyle/>
           <a:p>
             <a:r>
               <a:rPr lang="en-US" dirty="0"/>
-              <a:t>Session 1 and Session 2 labeled jointly</a:t>
-            </a:r>
-          </a:p>
-        </p:txBody>
-      </p:sp>
-      <p:pic>
-        <p:nvPicPr>
-          <p:cNvPr id="4" name="Picture 3"/>
-          <p:cNvPicPr>
-            <a:picLocks noChangeAspect="1"/>
-          </p:cNvPicPr>
+              <a:t>Joint Parcellation 2 independent groups of 20 subjects each</a:t>
+            </a:r>
+          </a:p>
+        </p:txBody>
+      </p:sp>
+      <p:grpSp>
+        <p:nvGrpSpPr>
+          <p:cNvPr id="4" name="Group 3"/>
+          <p:cNvGrpSpPr/>
           <p:nvPr/>
-        </p:nvPicPr>
-        <p:blipFill>
-          <a:blip r:embed="rId2">
-            <a:extLst>
-              <a:ext uri="{28A0092B-C50C-407E-A947-70E740481C1C}">
-                <a14:useLocalDpi xmlns:a14="http://schemas.microsoft.com/office/drawing/2010/main" val="0"/>
-              </a:ext>
-            </a:extLst>
-          </a:blip>
-          <a:stretch>
-            <a:fillRect/>
-          </a:stretch>
-        </p:blipFill>
-        <p:spPr>
-          <a:xfrm>
-            <a:off x="881063" y="1395413"/>
-            <a:ext cx="2571750" cy="1866900"/>
+        </p:nvGrpSpPr>
+        <p:grpSpPr>
+          <a:xfrm>
+            <a:off x="1307048" y="1435443"/>
+            <a:ext cx="5143502" cy="4103132"/>
+            <a:chOff x="1307048" y="1911905"/>
+            <a:chExt cx="5143502" cy="4103132"/>
+          </a:xfrm>
+        </p:grpSpPr>
+        <p:pic>
+          <p:nvPicPr>
+            <p:cNvPr id="12" name="Picture 11"/>
+            <p:cNvPicPr>
+              <a:picLocks noChangeAspect="1"/>
+            </p:cNvPicPr>
+            <p:nvPr/>
+          </p:nvPicPr>
+          <p:blipFill>
+            <a:blip r:embed="rId2">
+              <a:extLst>
+                <a:ext uri="{28A0092B-C50C-407E-A947-70E740481C1C}">
+                  <a14:useLocalDpi xmlns:a14="http://schemas.microsoft.com/office/drawing/2010/main" val="0"/>
+                </a:ext>
+              </a:extLst>
+            </a:blip>
+            <a:stretch>
+              <a:fillRect/>
+            </a:stretch>
+          </p:blipFill>
+          <p:spPr>
+            <a:xfrm>
+              <a:off x="1307050" y="2281237"/>
+              <a:ext cx="2571750" cy="1866900"/>
+            </a:xfrm>
+            <a:prstGeom prst="rect">
+              <a:avLst/>
+            </a:prstGeom>
+          </p:spPr>
+        </p:pic>
+        <p:pic>
+          <p:nvPicPr>
+            <p:cNvPr id="13" name="Picture 12"/>
+            <p:cNvPicPr>
+              <a:picLocks noChangeAspect="1"/>
+            </p:cNvPicPr>
+            <p:nvPr/>
+          </p:nvPicPr>
+          <p:blipFill>
+            <a:blip r:embed="rId3">
+              <a:extLst>
+                <a:ext uri="{28A0092B-C50C-407E-A947-70E740481C1C}">
+                  <a14:useLocalDpi xmlns:a14="http://schemas.microsoft.com/office/drawing/2010/main" val="0"/>
+                </a:ext>
+              </a:extLst>
+            </a:blip>
+            <a:stretch>
+              <a:fillRect/>
+            </a:stretch>
+          </p:blipFill>
+          <p:spPr>
+            <a:xfrm>
+              <a:off x="3878799" y="2281237"/>
+              <a:ext cx="2571750" cy="1866900"/>
+            </a:xfrm>
+            <a:prstGeom prst="rect">
+              <a:avLst/>
+            </a:prstGeom>
+          </p:spPr>
+        </p:pic>
+        <p:pic>
+          <p:nvPicPr>
+            <p:cNvPr id="14" name="Picture 13"/>
+            <p:cNvPicPr>
+              <a:picLocks noChangeAspect="1"/>
+            </p:cNvPicPr>
+            <p:nvPr/>
+          </p:nvPicPr>
+          <p:blipFill>
+            <a:blip r:embed="rId4">
+              <a:extLst>
+                <a:ext uri="{28A0092B-C50C-407E-A947-70E740481C1C}">
+                  <a14:useLocalDpi xmlns:a14="http://schemas.microsoft.com/office/drawing/2010/main" val="0"/>
+                </a:ext>
+              </a:extLst>
+            </a:blip>
+            <a:stretch>
+              <a:fillRect/>
+            </a:stretch>
+          </p:blipFill>
+          <p:spPr>
+            <a:xfrm>
+              <a:off x="3878800" y="4148137"/>
+              <a:ext cx="2571750" cy="1866900"/>
+            </a:xfrm>
+            <a:prstGeom prst="rect">
+              <a:avLst/>
+            </a:prstGeom>
+          </p:spPr>
+        </p:pic>
+        <p:pic>
+          <p:nvPicPr>
+            <p:cNvPr id="15" name="Picture 14"/>
+            <p:cNvPicPr>
+              <a:picLocks noChangeAspect="1"/>
+            </p:cNvPicPr>
+            <p:nvPr/>
+          </p:nvPicPr>
+          <p:blipFill>
+            <a:blip r:embed="rId5">
+              <a:extLst>
+                <a:ext uri="{28A0092B-C50C-407E-A947-70E740481C1C}">
+                  <a14:useLocalDpi xmlns:a14="http://schemas.microsoft.com/office/drawing/2010/main" val="0"/>
+                </a:ext>
+              </a:extLst>
+            </a:blip>
+            <a:stretch>
+              <a:fillRect/>
+            </a:stretch>
+          </p:blipFill>
+          <p:spPr>
+            <a:xfrm>
+              <a:off x="1307048" y="4148137"/>
+              <a:ext cx="2571750" cy="1866900"/>
+            </a:xfrm>
+            <a:prstGeom prst="rect">
+              <a:avLst/>
+            </a:prstGeom>
+          </p:spPr>
+        </p:pic>
+        <p:sp>
+          <p:nvSpPr>
+            <p:cNvPr id="3" name="TextBox 2"/>
+            <p:cNvSpPr txBox="1"/>
+            <p:nvPr/>
+          </p:nvSpPr>
+          <p:spPr>
+            <a:xfrm>
+              <a:off x="2374221" y="1911905"/>
+              <a:ext cx="3009157" cy="369332"/>
+            </a:xfrm>
+            <a:prstGeom prst="rect">
+              <a:avLst/>
+            </a:prstGeom>
+            <a:noFill/>
+          </p:spPr>
+          <p:txBody>
+            <a:bodyPr wrap="none" rtlCol="0">
+              <a:spAutoFit/>
+            </a:bodyPr>
+            <a:lstStyle/>
+            <a:p>
+              <a:r>
+                <a:rPr lang="en-US" dirty="0"/>
+                <a:t>2 subjects from first group</a:t>
+              </a:r>
+            </a:p>
+          </p:txBody>
+        </p:sp>
+      </p:grpSp>
+      <p:grpSp>
+        <p:nvGrpSpPr>
+          <p:cNvPr id="5" name="Group 4"/>
+          <p:cNvGrpSpPr/>
+          <p:nvPr/>
+        </p:nvGrpSpPr>
+        <p:grpSpPr>
+          <a:xfrm>
+            <a:off x="6710362" y="1435443"/>
+            <a:ext cx="5143500" cy="4103132"/>
+            <a:chOff x="6710362" y="1911905"/>
+            <a:chExt cx="5143500" cy="4103132"/>
+          </a:xfrm>
+        </p:grpSpPr>
+        <p:pic>
+          <p:nvPicPr>
+            <p:cNvPr id="16" name="Picture 15"/>
+            <p:cNvPicPr>
+              <a:picLocks noChangeAspect="1"/>
+            </p:cNvPicPr>
+            <p:nvPr/>
+          </p:nvPicPr>
+          <p:blipFill>
+            <a:blip r:embed="rId6">
+              <a:extLst>
+                <a:ext uri="{28A0092B-C50C-407E-A947-70E740481C1C}">
+                  <a14:useLocalDpi xmlns:a14="http://schemas.microsoft.com/office/drawing/2010/main" val="0"/>
+                </a:ext>
+              </a:extLst>
+            </a:blip>
+            <a:stretch>
+              <a:fillRect/>
+            </a:stretch>
+          </p:blipFill>
+          <p:spPr>
+            <a:xfrm>
+              <a:off x="6710362" y="2281237"/>
+              <a:ext cx="2571750" cy="1866900"/>
+            </a:xfrm>
+            <a:prstGeom prst="rect">
+              <a:avLst/>
+            </a:prstGeom>
+          </p:spPr>
+        </p:pic>
+        <p:pic>
+          <p:nvPicPr>
+            <p:cNvPr id="17" name="Picture 16"/>
+            <p:cNvPicPr>
+              <a:picLocks noChangeAspect="1"/>
+            </p:cNvPicPr>
+            <p:nvPr/>
+          </p:nvPicPr>
+          <p:blipFill>
+            <a:blip r:embed="rId7">
+              <a:extLst>
+                <a:ext uri="{28A0092B-C50C-407E-A947-70E740481C1C}">
+                  <a14:useLocalDpi xmlns:a14="http://schemas.microsoft.com/office/drawing/2010/main" val="0"/>
+                </a:ext>
+              </a:extLst>
+            </a:blip>
+            <a:stretch>
+              <a:fillRect/>
+            </a:stretch>
+          </p:blipFill>
+          <p:spPr>
+            <a:xfrm>
+              <a:off x="6710362" y="4148137"/>
+              <a:ext cx="2571750" cy="1866900"/>
+            </a:xfrm>
+            <a:prstGeom prst="rect">
+              <a:avLst/>
+            </a:prstGeom>
+          </p:spPr>
+        </p:pic>
+        <p:pic>
+          <p:nvPicPr>
+            <p:cNvPr id="18" name="Picture 17"/>
+            <p:cNvPicPr>
+              <a:picLocks noChangeAspect="1"/>
+            </p:cNvPicPr>
+            <p:nvPr/>
+          </p:nvPicPr>
+          <p:blipFill>
+            <a:blip r:embed="rId8">
+              <a:extLst>
+                <a:ext uri="{28A0092B-C50C-407E-A947-70E740481C1C}">
+                  <a14:useLocalDpi xmlns:a14="http://schemas.microsoft.com/office/drawing/2010/main" val="0"/>
+                </a:ext>
+              </a:extLst>
+            </a:blip>
+            <a:stretch>
+              <a:fillRect/>
+            </a:stretch>
+          </p:blipFill>
+          <p:spPr>
+            <a:xfrm>
+              <a:off x="9282112" y="4148137"/>
+              <a:ext cx="2571750" cy="1866900"/>
+            </a:xfrm>
+            <a:prstGeom prst="rect">
+              <a:avLst/>
+            </a:prstGeom>
+          </p:spPr>
+        </p:pic>
+        <p:pic>
+          <p:nvPicPr>
+            <p:cNvPr id="19" name="Picture 18"/>
+            <p:cNvPicPr>
+              <a:picLocks noChangeAspect="1"/>
+            </p:cNvPicPr>
+            <p:nvPr/>
+          </p:nvPicPr>
+          <p:blipFill>
+            <a:blip r:embed="rId6">
+              <a:extLst>
+                <a:ext uri="{28A0092B-C50C-407E-A947-70E740481C1C}">
+                  <a14:useLocalDpi xmlns:a14="http://schemas.microsoft.com/office/drawing/2010/main" val="0"/>
+                </a:ext>
+              </a:extLst>
+            </a:blip>
+            <a:stretch>
+              <a:fillRect/>
+            </a:stretch>
+          </p:blipFill>
+          <p:spPr>
+            <a:xfrm>
+              <a:off x="9282112" y="2281237"/>
+              <a:ext cx="2571750" cy="1866900"/>
+            </a:xfrm>
+            <a:prstGeom prst="rect">
+              <a:avLst/>
+            </a:prstGeom>
+          </p:spPr>
+        </p:pic>
+        <p:sp>
+          <p:nvSpPr>
+            <p:cNvPr id="20" name="TextBox 19"/>
+            <p:cNvSpPr txBox="1"/>
+            <p:nvPr/>
+          </p:nvSpPr>
+          <p:spPr>
+            <a:xfrm>
+              <a:off x="7535480" y="1911905"/>
+              <a:ext cx="3493264" cy="369332"/>
+            </a:xfrm>
+            <a:prstGeom prst="rect">
+              <a:avLst/>
+            </a:prstGeom>
+            <a:noFill/>
+          </p:spPr>
+          <p:txBody>
+            <a:bodyPr wrap="none" rtlCol="0">
+              <a:spAutoFit/>
+            </a:bodyPr>
+            <a:lstStyle/>
+            <a:p>
+              <a:r>
+                <a:rPr lang="en-US" dirty="0"/>
+                <a:t>2 subjects from second group</a:t>
+              </a:r>
+            </a:p>
+          </p:txBody>
+        </p:sp>
+      </p:grpSp>
+      <p:sp>
+        <p:nvSpPr>
+          <p:cNvPr id="21" name="TextBox 20"/>
+          <p:cNvSpPr txBox="1"/>
+          <p:nvPr/>
+        </p:nvSpPr>
+        <p:spPr>
+          <a:xfrm>
+            <a:off x="1307048" y="5907907"/>
+            <a:ext cx="10153742" cy="369332"/>
           </a:xfrm>
           <a:prstGeom prst="rect">
             <a:avLst/>
           </a:prstGeom>
-        </p:spPr>
-      </p:pic>
-      <p:pic>
-        <p:nvPicPr>
-          <p:cNvPr id="5" name="Picture 4"/>
-          <p:cNvPicPr>
-            <a:picLocks noChangeAspect="1"/>
-          </p:cNvPicPr>
-          <p:nvPr/>
-        </p:nvPicPr>
-        <p:blipFill>
-          <a:blip r:embed="rId3">
-            <a:extLst>
-              <a:ext uri="{28A0092B-C50C-407E-A947-70E740481C1C}">
-                <a14:useLocalDpi xmlns:a14="http://schemas.microsoft.com/office/drawing/2010/main" val="0"/>
-              </a:ext>
-            </a:extLst>
-          </a:blip>
-          <a:stretch>
-            <a:fillRect/>
-          </a:stretch>
-        </p:blipFill>
-        <p:spPr>
-          <a:xfrm>
-            <a:off x="3452813" y="1395413"/>
-            <a:ext cx="2571750" cy="1866900"/>
-          </a:xfrm>
-          <a:prstGeom prst="rect">
-            <a:avLst/>
-          </a:prstGeom>
-        </p:spPr>
-      </p:pic>
-      <p:pic>
-        <p:nvPicPr>
-          <p:cNvPr id="8" name="Picture 7"/>
-          <p:cNvPicPr>
-            <a:picLocks noChangeAspect="1"/>
-          </p:cNvPicPr>
-          <p:nvPr/>
-        </p:nvPicPr>
-        <p:blipFill>
-          <a:blip r:embed="rId4">
-            <a:extLst>
-              <a:ext uri="{28A0092B-C50C-407E-A947-70E740481C1C}">
-                <a14:useLocalDpi xmlns:a14="http://schemas.microsoft.com/office/drawing/2010/main" val="0"/>
-              </a:ext>
-            </a:extLst>
-          </a:blip>
-          <a:stretch>
-            <a:fillRect/>
-          </a:stretch>
-        </p:blipFill>
-        <p:spPr>
-          <a:xfrm>
-            <a:off x="881063" y="3262313"/>
-            <a:ext cx="2571750" cy="1866900"/>
-          </a:xfrm>
-          <a:prstGeom prst="rect">
-            <a:avLst/>
-          </a:prstGeom>
-        </p:spPr>
-      </p:pic>
-      <p:pic>
-        <p:nvPicPr>
-          <p:cNvPr id="9" name="Picture 8"/>
-          <p:cNvPicPr>
-            <a:picLocks noChangeAspect="1"/>
-          </p:cNvPicPr>
-          <p:nvPr/>
-        </p:nvPicPr>
-        <p:blipFill>
-          <a:blip r:embed="rId5">
-            <a:extLst>
-              <a:ext uri="{28A0092B-C50C-407E-A947-70E740481C1C}">
-                <a14:useLocalDpi xmlns:a14="http://schemas.microsoft.com/office/drawing/2010/main" val="0"/>
-              </a:ext>
-            </a:extLst>
-          </a:blip>
-          <a:stretch>
-            <a:fillRect/>
-          </a:stretch>
-        </p:blipFill>
-        <p:spPr>
-          <a:xfrm>
-            <a:off x="3452813" y="3262313"/>
-            <a:ext cx="2571750" cy="1866900"/>
-          </a:xfrm>
-          <a:prstGeom prst="rect">
-            <a:avLst/>
-          </a:prstGeom>
-        </p:spPr>
-      </p:pic>
-      <p:pic>
-        <p:nvPicPr>
-          <p:cNvPr id="10" name="Picture 9"/>
-          <p:cNvPicPr>
-            <a:picLocks noChangeAspect="1"/>
-          </p:cNvPicPr>
-          <p:nvPr/>
-        </p:nvPicPr>
-        <p:blipFill>
-          <a:blip r:embed="rId6">
-            <a:extLst>
-              <a:ext uri="{28A0092B-C50C-407E-A947-70E740481C1C}">
-                <a14:useLocalDpi xmlns:a14="http://schemas.microsoft.com/office/drawing/2010/main" val="0"/>
-              </a:ext>
-            </a:extLst>
-          </a:blip>
-          <a:stretch>
-            <a:fillRect/>
-          </a:stretch>
-        </p:blipFill>
-        <p:spPr>
-          <a:xfrm>
-            <a:off x="6753225" y="1395413"/>
-            <a:ext cx="2571750" cy="1866900"/>
-          </a:xfrm>
-          <a:prstGeom prst="rect">
-            <a:avLst/>
-          </a:prstGeom>
-        </p:spPr>
-      </p:pic>
-      <p:pic>
-        <p:nvPicPr>
-          <p:cNvPr id="11" name="Picture 10"/>
-          <p:cNvPicPr>
-            <a:picLocks noChangeAspect="1"/>
-          </p:cNvPicPr>
-          <p:nvPr/>
-        </p:nvPicPr>
-        <p:blipFill>
-          <a:blip r:embed="rId7">
-            <a:extLst>
-              <a:ext uri="{28A0092B-C50C-407E-A947-70E740481C1C}">
-                <a14:useLocalDpi xmlns:a14="http://schemas.microsoft.com/office/drawing/2010/main" val="0"/>
-              </a:ext>
-            </a:extLst>
-          </a:blip>
-          <a:stretch>
-            <a:fillRect/>
-          </a:stretch>
-        </p:blipFill>
-        <p:spPr>
-          <a:xfrm>
-            <a:off x="6762752" y="3262313"/>
-            <a:ext cx="2571750" cy="1866900"/>
-          </a:xfrm>
-          <a:prstGeom prst="rect">
-            <a:avLst/>
-          </a:prstGeom>
-        </p:spPr>
-      </p:pic>
-      <p:pic>
-        <p:nvPicPr>
-          <p:cNvPr id="12" name="Picture 11"/>
-          <p:cNvPicPr>
-            <a:picLocks noChangeAspect="1"/>
-          </p:cNvPicPr>
-          <p:nvPr/>
-        </p:nvPicPr>
-        <p:blipFill>
-          <a:blip r:embed="rId8">
-            <a:extLst>
-              <a:ext uri="{28A0092B-C50C-407E-A947-70E740481C1C}">
-                <a14:useLocalDpi xmlns:a14="http://schemas.microsoft.com/office/drawing/2010/main" val="0"/>
-              </a:ext>
-            </a:extLst>
-          </a:blip>
-          <a:stretch>
-            <a:fillRect/>
-          </a:stretch>
-        </p:blipFill>
-        <p:spPr>
-          <a:xfrm>
-            <a:off x="9329736" y="1395413"/>
-            <a:ext cx="2571750" cy="1866900"/>
-          </a:xfrm>
-          <a:prstGeom prst="rect">
-            <a:avLst/>
-          </a:prstGeom>
-        </p:spPr>
-      </p:pic>
-      <p:pic>
-        <p:nvPicPr>
-          <p:cNvPr id="13" name="Picture 12"/>
-          <p:cNvPicPr>
-            <a:picLocks noChangeAspect="1"/>
-          </p:cNvPicPr>
-          <p:nvPr/>
-        </p:nvPicPr>
-        <p:blipFill>
-          <a:blip r:embed="rId9">
-            <a:extLst>
-              <a:ext uri="{28A0092B-C50C-407E-A947-70E740481C1C}">
-                <a14:useLocalDpi xmlns:a14="http://schemas.microsoft.com/office/drawing/2010/main" val="0"/>
-              </a:ext>
-            </a:extLst>
-          </a:blip>
-          <a:stretch>
-            <a:fillRect/>
-          </a:stretch>
-        </p:blipFill>
-        <p:spPr>
-          <a:xfrm>
-            <a:off x="9329736" y="3262313"/>
-            <a:ext cx="2571750" cy="1866900"/>
-          </a:xfrm>
-          <a:prstGeom prst="rect">
-            <a:avLst/>
-          </a:prstGeom>
-        </p:spPr>
-      </p:pic>
+          <a:noFill/>
+        </p:spPr>
+        <p:txBody>
+          <a:bodyPr wrap="none" rtlCol="0">
+            <a:spAutoFit/>
+          </a:bodyPr>
+          <a:lstStyle/>
+          <a:p>
+            <a:r>
+              <a:rPr lang="en-US" b="1" i="1" dirty="0"/>
+              <a:t>We get very consistent Parcellation even if two groups of 20 subjects are non-overlapping</a:t>
+            </a:r>
+          </a:p>
+        </p:txBody>
+      </p:sp>
     </p:spTree>
     <p:extLst>
       <p:ext uri="{BB962C8B-B14F-4D97-AF65-F5344CB8AC3E}">
-        <p14:creationId xmlns:p14="http://schemas.microsoft.com/office/powerpoint/2010/main" val="3642108323"/>
+        <p14:creationId xmlns:p14="http://schemas.microsoft.com/office/powerpoint/2010/main" val="3470648806"/>
       </p:ext>
     </p:extLst>
   </p:cSld>

</xml_diff>